<commit_message>
Minor update (wording) to JsonGenerator Overview document
</commit_message>
<xml_diff>
--- a/Thunder/JsonGenerator_Overview.pptx
+++ b/Thunder/JsonGenerator_Overview.pptx
@@ -226,7 +226,7 @@
           <a:p>
             <a:fld id="{CAEA8373-E49F-46A4-83C6-986B9F5B6AAB}" type="datetimeFigureOut">
               <a:rPr lang="en-GB" smtClean="0"/>
-              <a:t>04/06/2019</a:t>
+              <a:t>05/06/2019</a:t>
             </a:fld>
             <a:endParaRPr lang="en-GB"/>
           </a:p>
@@ -1816,7 +1816,7 @@
           </a:ln>
           <a:extLst>
             <a:ext uri="{C572A759-6A51-4108-AA02-DFA0A04FC94B}">
-              <ma14:wrappingTextBoxFlag xmlns="" xmlns:ma14="http://schemas.microsoft.com/office/mac/drawingml/2011/main" val="1"/>
+              <ma14:wrappingTextBoxFlag xmlns:ma14="http://schemas.microsoft.com/office/mac/drawingml/2011/main" xmlns="" val="1"/>
             </a:ext>
           </a:extLst>
         </p:spPr>
@@ -2356,7 +2356,7 @@
           </a:ln>
           <a:extLst>
             <a:ext uri="{C572A759-6A51-4108-AA02-DFA0A04FC94B}">
-              <ma14:wrappingTextBoxFlag xmlns="" xmlns:ma14="http://schemas.microsoft.com/office/mac/drawingml/2011/main" val="1"/>
+              <ma14:wrappingTextBoxFlag xmlns:ma14="http://schemas.microsoft.com/office/mac/drawingml/2011/main" xmlns="" val="1"/>
             </a:ext>
           </a:extLst>
         </p:spPr>
@@ -2415,7 +2415,7 @@
           </a:ln>
           <a:extLst>
             <a:ext uri="{C572A759-6A51-4108-AA02-DFA0A04FC94B}">
-              <ma14:wrappingTextBoxFlag xmlns="" xmlns:ma14="http://schemas.microsoft.com/office/mac/drawingml/2011/main" val="1"/>
+              <ma14:wrappingTextBoxFlag xmlns:ma14="http://schemas.microsoft.com/office/mac/drawingml/2011/main" xmlns="" val="1"/>
             </a:ext>
           </a:extLst>
         </p:spPr>
@@ -13071,10 +13071,10 @@
       </p:sp>
       <p:pic>
         <p:nvPicPr>
-          <p:cNvPr id="5" name="Obraz 4">
+          <p:cNvPr id="3" name="Obraz 2">
             <a:extLst>
               <a:ext uri="{FF2B5EF4-FFF2-40B4-BE49-F238E27FC236}">
-                <a16:creationId xmlns:a16="http://schemas.microsoft.com/office/drawing/2014/main" id="{AAE23C8C-76C1-4381-8979-0355029ACACE}"/>
+                <a16:creationId xmlns:a16="http://schemas.microsoft.com/office/drawing/2014/main" id="{7B6D60CC-762A-4FB1-A153-D6409A218E79}"/>
               </a:ext>
             </a:extLst>
           </p:cNvPr>
@@ -13091,8 +13091,8 @@
         </p:blipFill>
         <p:spPr>
           <a:xfrm>
-            <a:off x="907306" y="952500"/>
-            <a:ext cx="7796427" cy="5693832"/>
+            <a:off x="901700" y="986366"/>
+            <a:ext cx="8627533" cy="5634567"/>
           </a:xfrm>
           <a:prstGeom prst="rect">
             <a:avLst/>

</xml_diff>

<commit_message>
Update JsonGenerator_Overview with latest command line dump
</commit_message>
<xml_diff>
--- a/Thunder/JsonGenerator_Overview.pptx
+++ b/Thunder/JsonGenerator_Overview.pptx
@@ -5,7 +5,7 @@
     <p:sldMasterId id="2147483660" r:id="rId1"/>
   </p:sldMasterIdLst>
   <p:notesMasterIdLst>
-    <p:notesMasterId r:id="rId19"/>
+    <p:notesMasterId r:id="rId20"/>
   </p:notesMasterIdLst>
   <p:sldIdLst>
     <p:sldId id="257" r:id="rId2"/>
@@ -19,12 +19,13 @@
     <p:sldId id="290" r:id="rId10"/>
     <p:sldId id="291" r:id="rId11"/>
     <p:sldId id="274" r:id="rId12"/>
-    <p:sldId id="283" r:id="rId13"/>
-    <p:sldId id="287" r:id="rId14"/>
-    <p:sldId id="286" r:id="rId15"/>
-    <p:sldId id="289" r:id="rId16"/>
-    <p:sldId id="285" r:id="rId17"/>
-    <p:sldId id="284" r:id="rId18"/>
+    <p:sldId id="292" r:id="rId13"/>
+    <p:sldId id="283" r:id="rId14"/>
+    <p:sldId id="287" r:id="rId15"/>
+    <p:sldId id="286" r:id="rId16"/>
+    <p:sldId id="289" r:id="rId17"/>
+    <p:sldId id="285" r:id="rId18"/>
+    <p:sldId id="284" r:id="rId19"/>
   </p:sldIdLst>
   <p:sldSz cx="12192000" cy="6858000"/>
   <p:notesSz cx="6858000" cy="9144000"/>
@@ -1816,7 +1817,7 @@
           </a:ln>
           <a:extLst>
             <a:ext uri="{C572A759-6A51-4108-AA02-DFA0A04FC94B}">
-              <ma14:wrappingTextBoxFlag xmlns:ma14="http://schemas.microsoft.com/office/mac/drawingml/2011/main" xmlns="" val="1"/>
+              <ma14:wrappingTextBoxFlag xmlns="" xmlns:ma14="http://schemas.microsoft.com/office/mac/drawingml/2011/main" val="1"/>
             </a:ext>
           </a:extLst>
         </p:spPr>
@@ -2356,7 +2357,7 @@
           </a:ln>
           <a:extLst>
             <a:ext uri="{C572A759-6A51-4108-AA02-DFA0A04FC94B}">
-              <ma14:wrappingTextBoxFlag xmlns:ma14="http://schemas.microsoft.com/office/mac/drawingml/2011/main" xmlns="" val="1"/>
+              <ma14:wrappingTextBoxFlag xmlns="" xmlns:ma14="http://schemas.microsoft.com/office/mac/drawingml/2011/main" val="1"/>
             </a:ext>
           </a:extLst>
         </p:spPr>
@@ -2415,7 +2416,7 @@
           </a:ln>
           <a:extLst>
             <a:ext uri="{C572A759-6A51-4108-AA02-DFA0A04FC94B}">
-              <ma14:wrappingTextBoxFlag xmlns:ma14="http://schemas.microsoft.com/office/mac/drawingml/2011/main" xmlns="" val="1"/>
+              <ma14:wrappingTextBoxFlag xmlns="" xmlns:ma14="http://schemas.microsoft.com/office/mac/drawingml/2011/main" val="1"/>
             </a:ext>
           </a:extLst>
         </p:spPr>
@@ -2824,14 +2825,17 @@
               </a:rPr>
               <a:t>handling</a:t>
             </a:r>
-            <a:endParaRPr lang="pl-PL" sz="2400" kern="0" spc="0" dirty="0">
-              <a:solidFill>
-                <a:srgbClr val="000000"/>
-              </a:solidFill>
-              <a:latin typeface="Calibri" panose="020F0502020204030204" pitchFamily="34" charset="0"/>
-              <a:cs typeface="Calibri" panose="020F0502020204030204" pitchFamily="34" charset="0"/>
-              <a:sym typeface="Helvetica"/>
-            </a:endParaRPr>
+            <a:r>
+              <a:rPr lang="pl-PL" sz="2400" kern="0" spc="0" dirty="0">
+                <a:solidFill>
+                  <a:srgbClr val="000000"/>
+                </a:solidFill>
+                <a:latin typeface="Calibri" panose="020F0502020204030204" pitchFamily="34" charset="0"/>
+                <a:cs typeface="Calibri" panose="020F0502020204030204" pitchFamily="34" charset="0"/>
+                <a:sym typeface="Helvetica"/>
+              </a:rPr>
+              <a:t>:</a:t>
+            </a:r>
           </a:p>
           <a:p>
             <a:pPr defTabSz="412750" latinLnBrk="1" hangingPunct="0">
@@ -5570,6 +5574,1081 @@
               <a:t> Generator – </a:t>
             </a:r>
             <a:r>
+              <a:rPr lang="pl-PL" sz="3600" dirty="0"/>
+              <a:t>API Definition </a:t>
+            </a:r>
+            <a:r>
+              <a:rPr lang="pl-PL" sz="3600" dirty="0" err="1"/>
+              <a:t>Reuse</a:t>
+            </a:r>
+            <a:endParaRPr lang="en-GB" sz="3600" dirty="0"/>
+          </a:p>
+        </p:txBody>
+      </p:sp>
+      <p:sp>
+        <p:nvSpPr>
+          <p:cNvPr id="3" name="Premium Applications Multiple premium applications are being added on top of the Application Framework…">
+            <a:extLst>
+              <a:ext uri="{FF2B5EF4-FFF2-40B4-BE49-F238E27FC236}">
+                <a16:creationId xmlns:a16="http://schemas.microsoft.com/office/drawing/2014/main" id="{6FC787A0-E67F-402A-81A4-FE09510F41B7}"/>
+              </a:ext>
+            </a:extLst>
+          </p:cNvPr>
+          <p:cNvSpPr txBox="1">
+            <a:spLocks/>
+          </p:cNvSpPr>
+          <p:nvPr/>
+        </p:nvSpPr>
+        <p:spPr>
+          <a:xfrm>
+            <a:off x="762000" y="1202917"/>
+            <a:ext cx="10358967" cy="4885675"/>
+          </a:xfrm>
+          <a:prstGeom prst="rect">
+            <a:avLst/>
+          </a:prstGeom>
+        </p:spPr>
+        <p:txBody>
+          <a:bodyPr wrap="square">
+            <a:noAutofit/>
+          </a:bodyPr>
+          <a:lstStyle>
+            <a:lvl1pPr marL="439615" indent="-439615" defTabSz="457200">
+              <a:lnSpc>
+                <a:spcPct val="120000"/>
+              </a:lnSpc>
+              <a:spcBef>
+                <a:spcPts val="5200"/>
+              </a:spcBef>
+              <a:buSzPct val="75000"/>
+              <a:buChar char="•"/>
+              <a:defRPr sz="3600" spc="-30">
+                <a:solidFill>
+                  <a:srgbClr val="363534"/>
+                </a:solidFill>
+                <a:latin typeface="+mj-lt"/>
+                <a:ea typeface="+mj-ea"/>
+                <a:cs typeface="+mj-cs"/>
+                <a:sym typeface="Helvetica Light"/>
+              </a:defRPr>
+            </a:lvl1pPr>
+            <a:lvl2pPr marL="1074615" indent="-439615" defTabSz="457200">
+              <a:lnSpc>
+                <a:spcPct val="120000"/>
+              </a:lnSpc>
+              <a:spcBef>
+                <a:spcPts val="5200"/>
+              </a:spcBef>
+              <a:buSzPct val="75000"/>
+              <a:buChar char="•"/>
+              <a:defRPr sz="3600" spc="-30">
+                <a:solidFill>
+                  <a:srgbClr val="363534"/>
+                </a:solidFill>
+                <a:latin typeface="+mj-lt"/>
+                <a:ea typeface="+mj-ea"/>
+                <a:cs typeface="+mj-cs"/>
+                <a:sym typeface="Helvetica Light"/>
+              </a:defRPr>
+            </a:lvl2pPr>
+            <a:lvl3pPr marL="1709615" indent="-439615" defTabSz="457200">
+              <a:lnSpc>
+                <a:spcPct val="120000"/>
+              </a:lnSpc>
+              <a:spcBef>
+                <a:spcPts val="5200"/>
+              </a:spcBef>
+              <a:buSzPct val="75000"/>
+              <a:buChar char="•"/>
+              <a:defRPr sz="3600" spc="-30">
+                <a:solidFill>
+                  <a:srgbClr val="363534"/>
+                </a:solidFill>
+                <a:latin typeface="+mj-lt"/>
+                <a:ea typeface="+mj-ea"/>
+                <a:cs typeface="+mj-cs"/>
+                <a:sym typeface="Helvetica Light"/>
+              </a:defRPr>
+            </a:lvl3pPr>
+            <a:lvl4pPr marL="2344615" indent="-439615" defTabSz="457200">
+              <a:lnSpc>
+                <a:spcPct val="120000"/>
+              </a:lnSpc>
+              <a:spcBef>
+                <a:spcPts val="5200"/>
+              </a:spcBef>
+              <a:buSzPct val="75000"/>
+              <a:buChar char="•"/>
+              <a:defRPr sz="3600" spc="-30">
+                <a:solidFill>
+                  <a:srgbClr val="363534"/>
+                </a:solidFill>
+                <a:latin typeface="+mj-lt"/>
+                <a:ea typeface="+mj-ea"/>
+                <a:cs typeface="+mj-cs"/>
+                <a:sym typeface="Helvetica Light"/>
+              </a:defRPr>
+            </a:lvl4pPr>
+            <a:lvl5pPr marL="2979615" indent="-439615" defTabSz="457200">
+              <a:lnSpc>
+                <a:spcPct val="120000"/>
+              </a:lnSpc>
+              <a:spcBef>
+                <a:spcPts val="5200"/>
+              </a:spcBef>
+              <a:buSzPct val="75000"/>
+              <a:buChar char="•"/>
+              <a:defRPr sz="3600" spc="-30">
+                <a:solidFill>
+                  <a:srgbClr val="363534"/>
+                </a:solidFill>
+                <a:latin typeface="+mj-lt"/>
+                <a:ea typeface="+mj-ea"/>
+                <a:cs typeface="+mj-cs"/>
+                <a:sym typeface="Helvetica Light"/>
+              </a:defRPr>
+            </a:lvl5pPr>
+            <a:lvl6pPr marL="3614615" indent="-439615" defTabSz="457200">
+              <a:lnSpc>
+                <a:spcPct val="120000"/>
+              </a:lnSpc>
+              <a:spcBef>
+                <a:spcPts val="5200"/>
+              </a:spcBef>
+              <a:buSzPct val="75000"/>
+              <a:buChar char="•"/>
+              <a:defRPr sz="3600" spc="-30">
+                <a:solidFill>
+                  <a:srgbClr val="363534"/>
+                </a:solidFill>
+                <a:latin typeface="+mj-lt"/>
+                <a:ea typeface="+mj-ea"/>
+                <a:cs typeface="+mj-cs"/>
+                <a:sym typeface="Helvetica Light"/>
+              </a:defRPr>
+            </a:lvl6pPr>
+            <a:lvl7pPr marL="4249615" indent="-439615" defTabSz="457200">
+              <a:lnSpc>
+                <a:spcPct val="120000"/>
+              </a:lnSpc>
+              <a:spcBef>
+                <a:spcPts val="5200"/>
+              </a:spcBef>
+              <a:buSzPct val="75000"/>
+              <a:buChar char="•"/>
+              <a:defRPr sz="3600" spc="-30">
+                <a:solidFill>
+                  <a:srgbClr val="363534"/>
+                </a:solidFill>
+                <a:latin typeface="+mj-lt"/>
+                <a:ea typeface="+mj-ea"/>
+                <a:cs typeface="+mj-cs"/>
+                <a:sym typeface="Helvetica Light"/>
+              </a:defRPr>
+            </a:lvl7pPr>
+            <a:lvl8pPr marL="4884615" indent="-439615" defTabSz="457200">
+              <a:lnSpc>
+                <a:spcPct val="120000"/>
+              </a:lnSpc>
+              <a:spcBef>
+                <a:spcPts val="5200"/>
+              </a:spcBef>
+              <a:buSzPct val="75000"/>
+              <a:buChar char="•"/>
+              <a:defRPr sz="3600" spc="-30">
+                <a:solidFill>
+                  <a:srgbClr val="363534"/>
+                </a:solidFill>
+                <a:latin typeface="+mj-lt"/>
+                <a:ea typeface="+mj-ea"/>
+                <a:cs typeface="+mj-cs"/>
+                <a:sym typeface="Helvetica Light"/>
+              </a:defRPr>
+            </a:lvl8pPr>
+            <a:lvl9pPr marL="5519615" indent="-439615" defTabSz="457200">
+              <a:lnSpc>
+                <a:spcPct val="120000"/>
+              </a:lnSpc>
+              <a:spcBef>
+                <a:spcPts val="5200"/>
+              </a:spcBef>
+              <a:buSzPct val="75000"/>
+              <a:buChar char="•"/>
+              <a:defRPr sz="3600" spc="-30">
+                <a:solidFill>
+                  <a:srgbClr val="363534"/>
+                </a:solidFill>
+                <a:latin typeface="+mj-lt"/>
+                <a:ea typeface="+mj-ea"/>
+                <a:cs typeface="+mj-cs"/>
+                <a:sym typeface="Helvetica Light"/>
+              </a:defRPr>
+            </a:lvl9pPr>
+          </a:lstStyle>
+          <a:p>
+            <a:pPr marL="0" indent="0" defTabSz="412750" latinLnBrk="1" hangingPunct="0">
+              <a:lnSpc>
+                <a:spcPct val="100000"/>
+              </a:lnSpc>
+              <a:spcBef>
+                <a:spcPts val="0"/>
+              </a:spcBef>
+              <a:buSzTx/>
+              <a:buNone/>
+            </a:pPr>
+            <a:r>
+              <a:rPr lang="pl-PL" sz="2000" kern="0" spc="0" dirty="0" err="1">
+                <a:solidFill>
+                  <a:srgbClr val="000000"/>
+                </a:solidFill>
+                <a:latin typeface="Calibri" panose="020F0502020204030204" pitchFamily="34" charset="0"/>
+                <a:cs typeface="Calibri" panose="020F0502020204030204" pitchFamily="34" charset="0"/>
+                <a:sym typeface="Helvetica"/>
+              </a:rPr>
+              <a:t>If</a:t>
+            </a:r>
+            <a:r>
+              <a:rPr lang="pl-PL" sz="2000" kern="0" spc="0" dirty="0">
+                <a:solidFill>
+                  <a:srgbClr val="000000"/>
+                </a:solidFill>
+                <a:latin typeface="Calibri" panose="020F0502020204030204" pitchFamily="34" charset="0"/>
+                <a:cs typeface="Calibri" panose="020F0502020204030204" pitchFamily="34" charset="0"/>
+                <a:sym typeface="Helvetica"/>
+              </a:rPr>
+              <a:t> </a:t>
+            </a:r>
+            <a:r>
+              <a:rPr lang="pl-PL" sz="2000" kern="0" spc="0" dirty="0" err="1">
+                <a:solidFill>
+                  <a:srgbClr val="000000"/>
+                </a:solidFill>
+                <a:latin typeface="Calibri" panose="020F0502020204030204" pitchFamily="34" charset="0"/>
+                <a:cs typeface="Calibri" panose="020F0502020204030204" pitchFamily="34" charset="0"/>
+                <a:sym typeface="Helvetica"/>
+              </a:rPr>
+              <a:t>an</a:t>
+            </a:r>
+            <a:r>
+              <a:rPr lang="pl-PL" sz="2000" kern="0" spc="0" dirty="0">
+                <a:solidFill>
+                  <a:srgbClr val="000000"/>
+                </a:solidFill>
+                <a:latin typeface="Calibri" panose="020F0502020204030204" pitchFamily="34" charset="0"/>
+                <a:cs typeface="Calibri" panose="020F0502020204030204" pitchFamily="34" charset="0"/>
+                <a:sym typeface="Helvetica"/>
+              </a:rPr>
+              <a:t> </a:t>
+            </a:r>
+            <a:r>
+              <a:rPr lang="pl-PL" sz="2000" kern="0" spc="0" dirty="0" err="1">
+                <a:solidFill>
+                  <a:srgbClr val="000000"/>
+                </a:solidFill>
+                <a:latin typeface="Calibri" panose="020F0502020204030204" pitchFamily="34" charset="0"/>
+                <a:cs typeface="Calibri" panose="020F0502020204030204" pitchFamily="34" charset="0"/>
+                <a:sym typeface="Helvetica"/>
+              </a:rPr>
+              <a:t>interface</a:t>
+            </a:r>
+            <a:r>
+              <a:rPr lang="pl-PL" sz="2000" kern="0" spc="0" dirty="0">
+                <a:solidFill>
+                  <a:srgbClr val="000000"/>
+                </a:solidFill>
+                <a:latin typeface="Calibri" panose="020F0502020204030204" pitchFamily="34" charset="0"/>
+                <a:cs typeface="Calibri" panose="020F0502020204030204" pitchFamily="34" charset="0"/>
+                <a:sym typeface="Helvetica"/>
+              </a:rPr>
+              <a:t> </a:t>
+            </a:r>
+            <a:r>
+              <a:rPr lang="pl-PL" sz="2000" kern="0" spc="0" dirty="0" err="1">
+                <a:solidFill>
+                  <a:srgbClr val="000000"/>
+                </a:solidFill>
+                <a:latin typeface="Calibri" panose="020F0502020204030204" pitchFamily="34" charset="0"/>
+                <a:cs typeface="Calibri" panose="020F0502020204030204" pitchFamily="34" charset="0"/>
+                <a:sym typeface="Helvetica"/>
+              </a:rPr>
+              <a:t>is</a:t>
+            </a:r>
+            <a:r>
+              <a:rPr lang="pl-PL" sz="2000" kern="0" spc="0" dirty="0">
+                <a:solidFill>
+                  <a:srgbClr val="000000"/>
+                </a:solidFill>
+                <a:latin typeface="Calibri" panose="020F0502020204030204" pitchFamily="34" charset="0"/>
+                <a:cs typeface="Calibri" panose="020F0502020204030204" pitchFamily="34" charset="0"/>
+                <a:sym typeface="Helvetica"/>
+              </a:rPr>
+              <a:t> </a:t>
+            </a:r>
+            <a:r>
+              <a:rPr lang="pl-PL" sz="2000" kern="0" spc="0" dirty="0" err="1">
+                <a:solidFill>
+                  <a:srgbClr val="000000"/>
+                </a:solidFill>
+                <a:latin typeface="Calibri" panose="020F0502020204030204" pitchFamily="34" charset="0"/>
+                <a:cs typeface="Calibri" panose="020F0502020204030204" pitchFamily="34" charset="0"/>
+                <a:sym typeface="Helvetica"/>
+              </a:rPr>
+              <a:t>inheriting</a:t>
+            </a:r>
+            <a:r>
+              <a:rPr lang="pl-PL" sz="2000" kern="0" spc="0" dirty="0">
+                <a:solidFill>
+                  <a:srgbClr val="000000"/>
+                </a:solidFill>
+                <a:latin typeface="Calibri" panose="020F0502020204030204" pitchFamily="34" charset="0"/>
+                <a:cs typeface="Calibri" panose="020F0502020204030204" pitchFamily="34" charset="0"/>
+                <a:sym typeface="Helvetica"/>
+              </a:rPr>
+              <a:t> </a:t>
+            </a:r>
+            <a:r>
+              <a:rPr lang="pl-PL" sz="2000" kern="0" spc="0" dirty="0" err="1">
+                <a:solidFill>
+                  <a:srgbClr val="000000"/>
+                </a:solidFill>
+                <a:latin typeface="Calibri" panose="020F0502020204030204" pitchFamily="34" charset="0"/>
+                <a:cs typeface="Calibri" panose="020F0502020204030204" pitchFamily="34" charset="0"/>
+                <a:sym typeface="Helvetica"/>
+              </a:rPr>
+              <a:t>or</a:t>
+            </a:r>
+            <a:r>
+              <a:rPr lang="pl-PL" sz="2000" kern="0" spc="0" dirty="0">
+                <a:solidFill>
+                  <a:srgbClr val="000000"/>
+                </a:solidFill>
+                <a:latin typeface="Calibri" panose="020F0502020204030204" pitchFamily="34" charset="0"/>
+                <a:cs typeface="Calibri" panose="020F0502020204030204" pitchFamily="34" charset="0"/>
+                <a:sym typeface="Helvetica"/>
+              </a:rPr>
+              <a:t> </a:t>
+            </a:r>
+            <a:r>
+              <a:rPr lang="pl-PL" sz="2000" kern="0" spc="0" dirty="0" err="1">
+                <a:solidFill>
+                  <a:srgbClr val="000000"/>
+                </a:solidFill>
+                <a:latin typeface="Calibri" panose="020F0502020204030204" pitchFamily="34" charset="0"/>
+                <a:cs typeface="Calibri" panose="020F0502020204030204" pitchFamily="34" charset="0"/>
+                <a:sym typeface="Helvetica"/>
+              </a:rPr>
+              <a:t>aggregating</a:t>
+            </a:r>
+            <a:r>
+              <a:rPr lang="pl-PL" sz="2000" kern="0" spc="0" dirty="0">
+                <a:solidFill>
+                  <a:srgbClr val="000000"/>
+                </a:solidFill>
+                <a:latin typeface="Calibri" panose="020F0502020204030204" pitchFamily="34" charset="0"/>
+                <a:cs typeface="Calibri" panose="020F0502020204030204" pitchFamily="34" charset="0"/>
+                <a:sym typeface="Helvetica"/>
+              </a:rPr>
+              <a:t> </a:t>
+            </a:r>
+            <a:r>
+              <a:rPr lang="pl-PL" sz="2000" kern="0" spc="0" dirty="0" err="1">
+                <a:solidFill>
+                  <a:srgbClr val="000000"/>
+                </a:solidFill>
+                <a:latin typeface="Calibri" panose="020F0502020204030204" pitchFamily="34" charset="0"/>
+                <a:cs typeface="Calibri" panose="020F0502020204030204" pitchFamily="34" charset="0"/>
+                <a:sym typeface="Helvetica"/>
+              </a:rPr>
+              <a:t>another</a:t>
+            </a:r>
+            <a:r>
+              <a:rPr lang="pl-PL" sz="2000" kern="0" spc="0" dirty="0">
+                <a:solidFill>
+                  <a:srgbClr val="000000"/>
+                </a:solidFill>
+                <a:latin typeface="Calibri" panose="020F0502020204030204" pitchFamily="34" charset="0"/>
+                <a:cs typeface="Calibri" panose="020F0502020204030204" pitchFamily="34" charset="0"/>
+                <a:sym typeface="Helvetica"/>
+              </a:rPr>
+              <a:t> </a:t>
+            </a:r>
+            <a:r>
+              <a:rPr lang="pl-PL" sz="2000" kern="0" spc="0" dirty="0" err="1">
+                <a:solidFill>
+                  <a:srgbClr val="000000"/>
+                </a:solidFill>
+                <a:latin typeface="Calibri" panose="020F0502020204030204" pitchFamily="34" charset="0"/>
+                <a:cs typeface="Calibri" panose="020F0502020204030204" pitchFamily="34" charset="0"/>
+                <a:sym typeface="Helvetica"/>
+              </a:rPr>
+              <a:t>interface</a:t>
+            </a:r>
+            <a:r>
+              <a:rPr lang="pl-PL" sz="2000" kern="0" spc="0" dirty="0">
+                <a:solidFill>
+                  <a:srgbClr val="000000"/>
+                </a:solidFill>
+                <a:latin typeface="Calibri" panose="020F0502020204030204" pitchFamily="34" charset="0"/>
+                <a:cs typeface="Calibri" panose="020F0502020204030204" pitchFamily="34" charset="0"/>
+                <a:sym typeface="Helvetica"/>
+              </a:rPr>
+              <a:t>, </a:t>
+            </a:r>
+            <a:r>
+              <a:rPr lang="pl-PL" sz="2000" kern="0" spc="0" dirty="0" err="1">
+                <a:solidFill>
+                  <a:srgbClr val="000000"/>
+                </a:solidFill>
+                <a:latin typeface="Calibri" panose="020F0502020204030204" pitchFamily="34" charset="0"/>
+                <a:cs typeface="Calibri" panose="020F0502020204030204" pitchFamily="34" charset="0"/>
+                <a:sym typeface="Helvetica"/>
+              </a:rPr>
+              <a:t>its</a:t>
+            </a:r>
+            <a:r>
+              <a:rPr lang="pl-PL" sz="2000" kern="0" spc="0" dirty="0">
+                <a:solidFill>
+                  <a:srgbClr val="000000"/>
+                </a:solidFill>
+                <a:latin typeface="Calibri" panose="020F0502020204030204" pitchFamily="34" charset="0"/>
+                <a:cs typeface="Calibri" panose="020F0502020204030204" pitchFamily="34" charset="0"/>
+                <a:sym typeface="Helvetica"/>
+              </a:rPr>
+              <a:t> JSON file </a:t>
+            </a:r>
+            <a:r>
+              <a:rPr lang="pl-PL" sz="2000" kern="0" spc="0" dirty="0" err="1">
+                <a:solidFill>
+                  <a:srgbClr val="000000"/>
+                </a:solidFill>
+                <a:latin typeface="Calibri" panose="020F0502020204030204" pitchFamily="34" charset="0"/>
+                <a:cs typeface="Calibri" panose="020F0502020204030204" pitchFamily="34" charset="0"/>
+                <a:sym typeface="Helvetica"/>
+              </a:rPr>
+              <a:t>can</a:t>
+            </a:r>
+            <a:r>
+              <a:rPr lang="pl-PL" sz="2000" kern="0" spc="0" dirty="0">
+                <a:solidFill>
+                  <a:srgbClr val="000000"/>
+                </a:solidFill>
+                <a:latin typeface="Calibri" panose="020F0502020204030204" pitchFamily="34" charset="0"/>
+                <a:cs typeface="Calibri" panose="020F0502020204030204" pitchFamily="34" charset="0"/>
+                <a:sym typeface="Helvetica"/>
+              </a:rPr>
+              <a:t> be </a:t>
+            </a:r>
+            <a:r>
+              <a:rPr lang="pl-PL" sz="2000" kern="0" spc="0" dirty="0" err="1">
+                <a:solidFill>
+                  <a:srgbClr val="000000"/>
+                </a:solidFill>
+                <a:latin typeface="Calibri" panose="020F0502020204030204" pitchFamily="34" charset="0"/>
+                <a:cs typeface="Calibri" panose="020F0502020204030204" pitchFamily="34" charset="0"/>
+                <a:sym typeface="Helvetica"/>
+              </a:rPr>
+              <a:t>reused</a:t>
+            </a:r>
+            <a:r>
+              <a:rPr lang="pl-PL" sz="2000" kern="0" spc="0" dirty="0">
+                <a:solidFill>
+                  <a:srgbClr val="000000"/>
+                </a:solidFill>
+                <a:latin typeface="Calibri" panose="020F0502020204030204" pitchFamily="34" charset="0"/>
+                <a:cs typeface="Calibri" panose="020F0502020204030204" pitchFamily="34" charset="0"/>
+                <a:sym typeface="Helvetica"/>
+              </a:rPr>
+              <a:t> by </a:t>
+            </a:r>
+            <a:r>
+              <a:rPr lang="pl-PL" sz="2000" kern="0" spc="0" dirty="0" err="1">
+                <a:solidFill>
+                  <a:srgbClr val="000000"/>
+                </a:solidFill>
+                <a:latin typeface="Calibri" panose="020F0502020204030204" pitchFamily="34" charset="0"/>
+                <a:cs typeface="Calibri" panose="020F0502020204030204" pitchFamily="34" charset="0"/>
+                <a:sym typeface="Helvetica"/>
+              </a:rPr>
+              <a:t>adding</a:t>
+            </a:r>
+            <a:r>
+              <a:rPr lang="pl-PL" sz="2000" kern="0" spc="0" dirty="0">
+                <a:solidFill>
+                  <a:srgbClr val="000000"/>
+                </a:solidFill>
+                <a:latin typeface="Calibri" panose="020F0502020204030204" pitchFamily="34" charset="0"/>
+                <a:cs typeface="Calibri" panose="020F0502020204030204" pitchFamily="34" charset="0"/>
+                <a:sym typeface="Helvetica"/>
+              </a:rPr>
+              <a:t> a </a:t>
+            </a:r>
+            <a:r>
+              <a:rPr lang="pl-PL" sz="2000" kern="0" spc="0" dirty="0" err="1">
+                <a:solidFill>
+                  <a:srgbClr val="000000"/>
+                </a:solidFill>
+                <a:latin typeface="Calibri" panose="020F0502020204030204" pitchFamily="34" charset="0"/>
+                <a:cs typeface="Calibri" panose="020F0502020204030204" pitchFamily="34" charset="0"/>
+                <a:sym typeface="Helvetica"/>
+              </a:rPr>
+              <a:t>special</a:t>
+            </a:r>
+            <a:r>
+              <a:rPr lang="pl-PL" sz="2000" kern="0" spc="0" dirty="0">
+                <a:solidFill>
+                  <a:srgbClr val="000000"/>
+                </a:solidFill>
+                <a:latin typeface="Calibri" panose="020F0502020204030204" pitchFamily="34" charset="0"/>
+                <a:cs typeface="Calibri" panose="020F0502020204030204" pitchFamily="34" charset="0"/>
+                <a:sym typeface="Helvetica"/>
+              </a:rPr>
+              <a:t> </a:t>
+            </a:r>
+            <a:r>
+              <a:rPr lang="pl-PL" sz="2000" kern="0" spc="0" dirty="0" err="1">
+                <a:solidFill>
+                  <a:srgbClr val="000000"/>
+                </a:solidFill>
+                <a:latin typeface="Calibri" panose="020F0502020204030204" pitchFamily="34" charset="0"/>
+                <a:cs typeface="Calibri" panose="020F0502020204030204" pitchFamily="34" charset="0"/>
+                <a:sym typeface="Helvetica"/>
+              </a:rPr>
+              <a:t>tag</a:t>
+            </a:r>
+            <a:r>
+              <a:rPr lang="pl-PL" sz="2000" kern="0" spc="0" dirty="0">
+                <a:solidFill>
+                  <a:srgbClr val="000000"/>
+                </a:solidFill>
+                <a:latin typeface="Calibri" panose="020F0502020204030204" pitchFamily="34" charset="0"/>
+                <a:cs typeface="Calibri" panose="020F0502020204030204" pitchFamily="34" charset="0"/>
+                <a:sym typeface="Helvetica"/>
+              </a:rPr>
+              <a:t>:</a:t>
+            </a:r>
+          </a:p>
+          <a:p>
+            <a:pPr marL="0" indent="0" defTabSz="412750" latinLnBrk="1" hangingPunct="0">
+              <a:lnSpc>
+                <a:spcPct val="100000"/>
+              </a:lnSpc>
+              <a:spcBef>
+                <a:spcPts val="0"/>
+              </a:spcBef>
+              <a:buSzTx/>
+              <a:buNone/>
+            </a:pPr>
+            <a:endParaRPr lang="pl-PL" sz="2000" kern="0" spc="0" dirty="0">
+              <a:solidFill>
+                <a:srgbClr val="000000"/>
+              </a:solidFill>
+              <a:latin typeface="Calibri" panose="020F0502020204030204" pitchFamily="34" charset="0"/>
+              <a:cs typeface="Calibri" panose="020F0502020204030204" pitchFamily="34" charset="0"/>
+              <a:sym typeface="Helvetica"/>
+            </a:endParaRPr>
+          </a:p>
+          <a:p>
+            <a:pPr defTabSz="412750" latinLnBrk="1" hangingPunct="0">
+              <a:lnSpc>
+                <a:spcPct val="100000"/>
+              </a:lnSpc>
+              <a:spcBef>
+                <a:spcPts val="0"/>
+              </a:spcBef>
+              <a:buSzTx/>
+            </a:pPr>
+            <a:r>
+              <a:rPr lang="pl-PL" sz="2000" kern="0" spc="0" dirty="0" err="1">
+                <a:solidFill>
+                  <a:srgbClr val="000000"/>
+                </a:solidFill>
+                <a:latin typeface="Courier New" panose="02070309020205020404" pitchFamily="49" charset="0"/>
+                <a:cs typeface="Courier New" panose="02070309020205020404" pitchFamily="49" charset="0"/>
+                <a:sym typeface="Helvetica"/>
+              </a:rPr>
+              <a:t>include</a:t>
+            </a:r>
+            <a:r>
+              <a:rPr lang="pl-PL" sz="2000" kern="0" spc="0" dirty="0">
+                <a:solidFill>
+                  <a:srgbClr val="000000"/>
+                </a:solidFill>
+                <a:latin typeface="Calibri" panose="020F0502020204030204" pitchFamily="34" charset="0"/>
+                <a:cs typeface="Calibri" panose="020F0502020204030204" pitchFamily="34" charset="0"/>
+                <a:sym typeface="Helvetica"/>
+              </a:rPr>
+              <a:t> – </a:t>
+            </a:r>
+            <a:r>
+              <a:rPr lang="pl-PL" sz="2000" kern="0" spc="0" dirty="0" err="1">
+                <a:solidFill>
+                  <a:srgbClr val="000000"/>
+                </a:solidFill>
+                <a:latin typeface="Calibri" panose="020F0502020204030204" pitchFamily="34" charset="0"/>
+                <a:cs typeface="Calibri" panose="020F0502020204030204" pitchFamily="34" charset="0"/>
+                <a:sym typeface="Helvetica"/>
+              </a:rPr>
+              <a:t>an</a:t>
+            </a:r>
+            <a:r>
+              <a:rPr lang="pl-PL" sz="2000" kern="0" spc="0" dirty="0">
+                <a:solidFill>
+                  <a:srgbClr val="000000"/>
+                </a:solidFill>
+                <a:latin typeface="Calibri" panose="020F0502020204030204" pitchFamily="34" charset="0"/>
+                <a:cs typeface="Calibri" panose="020F0502020204030204" pitchFamily="34" charset="0"/>
+                <a:sym typeface="Helvetica"/>
+              </a:rPr>
+              <a:t> </a:t>
+            </a:r>
+            <a:r>
+              <a:rPr lang="pl-PL" sz="2000" kern="0" spc="0" dirty="0" err="1">
+                <a:solidFill>
+                  <a:srgbClr val="000000"/>
+                </a:solidFill>
+                <a:latin typeface="Calibri" panose="020F0502020204030204" pitchFamily="34" charset="0"/>
+                <a:cs typeface="Calibri" panose="020F0502020204030204" pitchFamily="34" charset="0"/>
+                <a:sym typeface="Helvetica"/>
+              </a:rPr>
+              <a:t>object</a:t>
+            </a:r>
+            <a:r>
+              <a:rPr lang="pl-PL" sz="2000" kern="0" spc="0" dirty="0">
+                <a:solidFill>
+                  <a:srgbClr val="000000"/>
+                </a:solidFill>
+                <a:latin typeface="Calibri" panose="020F0502020204030204" pitchFamily="34" charset="0"/>
+                <a:cs typeface="Calibri" panose="020F0502020204030204" pitchFamily="34" charset="0"/>
+                <a:sym typeface="Helvetica"/>
+              </a:rPr>
+              <a:t> listing </a:t>
+            </a:r>
+            <a:r>
+              <a:rPr lang="pl-PL" sz="2000" kern="0" spc="0" dirty="0">
+                <a:solidFill>
+                  <a:srgbClr val="000000"/>
+                </a:solidFill>
+                <a:latin typeface="Courier New" panose="02070309020205020404" pitchFamily="49" charset="0"/>
+                <a:cs typeface="Courier New" panose="02070309020205020404" pitchFamily="49" charset="0"/>
+                <a:sym typeface="Helvetica"/>
+              </a:rPr>
+              <a:t>$</a:t>
+            </a:r>
+            <a:r>
+              <a:rPr lang="pl-PL" sz="2000" kern="0" spc="0" dirty="0" err="1">
+                <a:solidFill>
+                  <a:srgbClr val="000000"/>
+                </a:solidFill>
+                <a:latin typeface="Courier New" panose="02070309020205020404" pitchFamily="49" charset="0"/>
+                <a:cs typeface="Courier New" panose="02070309020205020404" pitchFamily="49" charset="0"/>
+                <a:sym typeface="Helvetica"/>
+              </a:rPr>
+              <a:t>ref</a:t>
+            </a:r>
+            <a:r>
+              <a:rPr lang="pl-PL" sz="2000" kern="0" spc="0" dirty="0" err="1">
+                <a:solidFill>
+                  <a:srgbClr val="000000"/>
+                </a:solidFill>
+                <a:latin typeface="Calibri" panose="020F0502020204030204" pitchFamily="34" charset="0"/>
+                <a:cs typeface="Calibri" panose="020F0502020204030204" pitchFamily="34" charset="0"/>
+                <a:sym typeface="Helvetica"/>
+              </a:rPr>
+              <a:t>’s</a:t>
+            </a:r>
+            <a:r>
+              <a:rPr lang="pl-PL" sz="2000" kern="0" spc="0" dirty="0">
+                <a:solidFill>
+                  <a:srgbClr val="000000"/>
+                </a:solidFill>
+                <a:latin typeface="Calibri" panose="020F0502020204030204" pitchFamily="34" charset="0"/>
+                <a:cs typeface="Calibri" panose="020F0502020204030204" pitchFamily="34" charset="0"/>
+                <a:sym typeface="Helvetica"/>
+              </a:rPr>
+              <a:t> to </a:t>
+            </a:r>
+            <a:r>
+              <a:rPr lang="pl-PL" sz="2000" kern="0" spc="0" dirty="0" err="1">
+                <a:solidFill>
+                  <a:srgbClr val="000000"/>
+                </a:solidFill>
+                <a:latin typeface="Calibri" panose="020F0502020204030204" pitchFamily="34" charset="0"/>
+                <a:cs typeface="Calibri" panose="020F0502020204030204" pitchFamily="34" charset="0"/>
+                <a:sym typeface="Helvetica"/>
+              </a:rPr>
+              <a:t>other</a:t>
+            </a:r>
+            <a:r>
+              <a:rPr lang="pl-PL" sz="2000" kern="0" spc="0" dirty="0">
+                <a:solidFill>
+                  <a:srgbClr val="000000"/>
+                </a:solidFill>
+                <a:latin typeface="Calibri" panose="020F0502020204030204" pitchFamily="34" charset="0"/>
+                <a:cs typeface="Calibri" panose="020F0502020204030204" pitchFamily="34" charset="0"/>
+                <a:sym typeface="Helvetica"/>
+              </a:rPr>
+              <a:t> JSON-RPC </a:t>
+            </a:r>
+            <a:r>
+              <a:rPr lang="pl-PL" sz="2000" kern="0" spc="0" dirty="0" err="1">
+                <a:solidFill>
+                  <a:srgbClr val="000000"/>
+                </a:solidFill>
+                <a:latin typeface="Calibri" panose="020F0502020204030204" pitchFamily="34" charset="0"/>
+                <a:cs typeface="Calibri" panose="020F0502020204030204" pitchFamily="34" charset="0"/>
+                <a:sym typeface="Helvetica"/>
+              </a:rPr>
+              <a:t>interface</a:t>
+            </a:r>
+            <a:r>
+              <a:rPr lang="pl-PL" sz="2000" kern="0" spc="0" dirty="0">
+                <a:solidFill>
+                  <a:srgbClr val="000000"/>
+                </a:solidFill>
+                <a:latin typeface="Calibri" panose="020F0502020204030204" pitchFamily="34" charset="0"/>
+                <a:cs typeface="Calibri" panose="020F0502020204030204" pitchFamily="34" charset="0"/>
+                <a:sym typeface="Helvetica"/>
+              </a:rPr>
+              <a:t> </a:t>
+            </a:r>
+            <a:r>
+              <a:rPr lang="pl-PL" sz="2000" kern="0" spc="0" dirty="0" err="1">
+                <a:solidFill>
+                  <a:srgbClr val="000000"/>
+                </a:solidFill>
+                <a:latin typeface="Calibri" panose="020F0502020204030204" pitchFamily="34" charset="0"/>
+                <a:cs typeface="Calibri" panose="020F0502020204030204" pitchFamily="34" charset="0"/>
+                <a:sym typeface="Helvetica"/>
+              </a:rPr>
+              <a:t>files</a:t>
+            </a:r>
+            <a:endParaRPr lang="pl-PL" sz="2000" kern="0" spc="0" dirty="0">
+              <a:solidFill>
+                <a:srgbClr val="000000"/>
+              </a:solidFill>
+              <a:latin typeface="Calibri" panose="020F0502020204030204" pitchFamily="34" charset="0"/>
+              <a:cs typeface="Calibri" panose="020F0502020204030204" pitchFamily="34" charset="0"/>
+              <a:sym typeface="Helvetica"/>
+            </a:endParaRPr>
+          </a:p>
+          <a:p>
+            <a:pPr marL="0" indent="0" defTabSz="412750" latinLnBrk="1" hangingPunct="0">
+              <a:lnSpc>
+                <a:spcPct val="100000"/>
+              </a:lnSpc>
+              <a:spcBef>
+                <a:spcPts val="0"/>
+              </a:spcBef>
+              <a:buSzTx/>
+              <a:buNone/>
+            </a:pPr>
+            <a:endParaRPr lang="pl-PL" sz="2000" kern="0" spc="0" dirty="0">
+              <a:solidFill>
+                <a:srgbClr val="000000"/>
+              </a:solidFill>
+              <a:latin typeface="Courier New" panose="02070309020205020404" pitchFamily="49" charset="0"/>
+              <a:cs typeface="Courier New" panose="02070309020205020404" pitchFamily="49" charset="0"/>
+              <a:sym typeface="Helvetica"/>
+            </a:endParaRPr>
+          </a:p>
+          <a:p>
+            <a:pPr marL="0" indent="0" defTabSz="412750" latinLnBrk="1" hangingPunct="0">
+              <a:lnSpc>
+                <a:spcPct val="100000"/>
+              </a:lnSpc>
+              <a:spcBef>
+                <a:spcPts val="0"/>
+              </a:spcBef>
+              <a:buSzTx/>
+              <a:buNone/>
+            </a:pPr>
+            <a:r>
+              <a:rPr lang="pl-PL" sz="2000" kern="0" spc="0" dirty="0">
+                <a:solidFill>
+                  <a:srgbClr val="000000"/>
+                </a:solidFill>
+                <a:latin typeface="Calibri" panose="020F0502020204030204" pitchFamily="34" charset="0"/>
+                <a:cs typeface="Calibri" panose="020F0502020204030204" pitchFamily="34" charset="0"/>
+                <a:sym typeface="Helvetica"/>
+              </a:rPr>
+              <a:t>The </a:t>
+            </a:r>
+            <a:r>
+              <a:rPr lang="pl-PL" sz="2000" kern="0" spc="0" dirty="0" err="1">
+                <a:solidFill>
+                  <a:srgbClr val="000000"/>
+                </a:solidFill>
+                <a:latin typeface="Calibri" panose="020F0502020204030204" pitchFamily="34" charset="0"/>
+                <a:cs typeface="Calibri" panose="020F0502020204030204" pitchFamily="34" charset="0"/>
+                <a:sym typeface="Helvetica"/>
+              </a:rPr>
+              <a:t>documentation</a:t>
+            </a:r>
+            <a:r>
+              <a:rPr lang="pl-PL" sz="2000" kern="0" spc="0" dirty="0">
+                <a:solidFill>
+                  <a:srgbClr val="000000"/>
+                </a:solidFill>
+                <a:latin typeface="Calibri" panose="020F0502020204030204" pitchFamily="34" charset="0"/>
+                <a:cs typeface="Calibri" panose="020F0502020204030204" pitchFamily="34" charset="0"/>
+                <a:sym typeface="Helvetica"/>
+              </a:rPr>
+              <a:t> and </a:t>
+            </a:r>
+            <a:r>
+              <a:rPr lang="pl-PL" sz="2000" kern="0" spc="0" dirty="0" err="1">
+                <a:solidFill>
+                  <a:srgbClr val="000000"/>
+                </a:solidFill>
+                <a:latin typeface="Calibri" panose="020F0502020204030204" pitchFamily="34" charset="0"/>
+                <a:cs typeface="Calibri" panose="020F0502020204030204" pitchFamily="34" charset="0"/>
+                <a:sym typeface="Helvetica"/>
+              </a:rPr>
+              <a:t>code</a:t>
+            </a:r>
+            <a:r>
+              <a:rPr lang="pl-PL" sz="2000" kern="0" spc="0" dirty="0">
+                <a:solidFill>
+                  <a:srgbClr val="000000"/>
+                </a:solidFill>
+                <a:latin typeface="Calibri" panose="020F0502020204030204" pitchFamily="34" charset="0"/>
+                <a:cs typeface="Calibri" panose="020F0502020204030204" pitchFamily="34" charset="0"/>
+                <a:sym typeface="Helvetica"/>
+              </a:rPr>
+              <a:t> </a:t>
+            </a:r>
+            <a:r>
+              <a:rPr lang="pl-PL" sz="2000" kern="0" spc="0" dirty="0" err="1">
+                <a:solidFill>
+                  <a:srgbClr val="000000"/>
+                </a:solidFill>
+                <a:latin typeface="Calibri" panose="020F0502020204030204" pitchFamily="34" charset="0"/>
+                <a:cs typeface="Calibri" panose="020F0502020204030204" pitchFamily="34" charset="0"/>
+                <a:sym typeface="Helvetica"/>
+              </a:rPr>
+              <a:t>will</a:t>
+            </a:r>
+            <a:r>
+              <a:rPr lang="pl-PL" sz="2000" kern="0" spc="0" dirty="0">
+                <a:solidFill>
+                  <a:srgbClr val="000000"/>
+                </a:solidFill>
+                <a:latin typeface="Calibri" panose="020F0502020204030204" pitchFamily="34" charset="0"/>
+                <a:cs typeface="Calibri" panose="020F0502020204030204" pitchFamily="34" charset="0"/>
+                <a:sym typeface="Helvetica"/>
+              </a:rPr>
+              <a:t> be </a:t>
+            </a:r>
+            <a:r>
+              <a:rPr lang="pl-PL" sz="2000" kern="0" spc="0" dirty="0" err="1">
+                <a:solidFill>
+                  <a:srgbClr val="000000"/>
+                </a:solidFill>
+                <a:latin typeface="Calibri" panose="020F0502020204030204" pitchFamily="34" charset="0"/>
+                <a:cs typeface="Calibri" panose="020F0502020204030204" pitchFamily="34" charset="0"/>
+                <a:sym typeface="Helvetica"/>
+              </a:rPr>
+              <a:t>adjusted</a:t>
+            </a:r>
+            <a:r>
+              <a:rPr lang="pl-PL" sz="2000" kern="0" spc="0" dirty="0">
+                <a:solidFill>
+                  <a:srgbClr val="000000"/>
+                </a:solidFill>
+                <a:latin typeface="Calibri" panose="020F0502020204030204" pitchFamily="34" charset="0"/>
+                <a:cs typeface="Calibri" panose="020F0502020204030204" pitchFamily="34" charset="0"/>
+                <a:sym typeface="Helvetica"/>
+              </a:rPr>
+              <a:t> </a:t>
+            </a:r>
+            <a:r>
+              <a:rPr lang="pl-PL" sz="2000" kern="0" spc="0" dirty="0" err="1">
+                <a:solidFill>
+                  <a:srgbClr val="000000"/>
+                </a:solidFill>
+                <a:latin typeface="Calibri" panose="020F0502020204030204" pitchFamily="34" charset="0"/>
+                <a:cs typeface="Calibri" panose="020F0502020204030204" pitchFamily="34" charset="0"/>
+                <a:sym typeface="Helvetica"/>
+              </a:rPr>
+              <a:t>accoringly</a:t>
+            </a:r>
+            <a:r>
+              <a:rPr lang="pl-PL" sz="2000" kern="0" spc="0" dirty="0">
+                <a:solidFill>
+                  <a:srgbClr val="000000"/>
+                </a:solidFill>
+                <a:latin typeface="Calibri" panose="020F0502020204030204" pitchFamily="34" charset="0"/>
+                <a:cs typeface="Calibri" panose="020F0502020204030204" pitchFamily="34" charset="0"/>
+                <a:sym typeface="Helvetica"/>
+              </a:rPr>
+              <a:t> (</a:t>
+            </a:r>
+            <a:r>
+              <a:rPr lang="pl-PL" sz="2000" kern="0" spc="0" dirty="0" err="1">
+                <a:solidFill>
+                  <a:srgbClr val="000000"/>
+                </a:solidFill>
+                <a:latin typeface="Calibri" panose="020F0502020204030204" pitchFamily="34" charset="0"/>
+                <a:cs typeface="Calibri" panose="020F0502020204030204" pitchFamily="34" charset="0"/>
+                <a:sym typeface="Helvetica"/>
+              </a:rPr>
+              <a:t>also</a:t>
+            </a:r>
+            <a:r>
+              <a:rPr lang="pl-PL" sz="2000" kern="0" spc="0" dirty="0">
+                <a:solidFill>
+                  <a:srgbClr val="000000"/>
+                </a:solidFill>
+                <a:latin typeface="Calibri" panose="020F0502020204030204" pitchFamily="34" charset="0"/>
+                <a:cs typeface="Calibri" panose="020F0502020204030204" pitchFamily="34" charset="0"/>
+                <a:sym typeface="Helvetica"/>
+              </a:rPr>
+              <a:t> with extra </a:t>
+            </a:r>
+            <a:r>
+              <a:rPr lang="pl-PL" sz="2000" kern="0" spc="0" dirty="0" err="1">
+                <a:solidFill>
+                  <a:srgbClr val="000000"/>
+                </a:solidFill>
+                <a:latin typeface="Calibri" panose="020F0502020204030204" pitchFamily="34" charset="0"/>
+                <a:cs typeface="Calibri" panose="020F0502020204030204" pitchFamily="34" charset="0"/>
+                <a:sym typeface="Helvetica"/>
+              </a:rPr>
+              <a:t>commentary</a:t>
+            </a:r>
+            <a:r>
+              <a:rPr lang="pl-PL" sz="2000" kern="0" spc="0" dirty="0">
+                <a:solidFill>
+                  <a:srgbClr val="000000"/>
+                </a:solidFill>
+                <a:latin typeface="Calibri" panose="020F0502020204030204" pitchFamily="34" charset="0"/>
+                <a:cs typeface="Calibri" panose="020F0502020204030204" pitchFamily="34" charset="0"/>
+                <a:sym typeface="Helvetica"/>
+              </a:rPr>
+              <a:t>).</a:t>
+            </a:r>
+          </a:p>
+          <a:p>
+            <a:pPr marL="0" indent="0" defTabSz="412750" latinLnBrk="1" hangingPunct="0">
+              <a:lnSpc>
+                <a:spcPct val="100000"/>
+              </a:lnSpc>
+              <a:spcBef>
+                <a:spcPts val="0"/>
+              </a:spcBef>
+              <a:buSzTx/>
+              <a:buNone/>
+            </a:pPr>
+            <a:endParaRPr lang="pl-PL" sz="2000" kern="0" spc="0" dirty="0">
+              <a:solidFill>
+                <a:srgbClr val="000000"/>
+              </a:solidFill>
+              <a:latin typeface="Courier New" panose="02070309020205020404" pitchFamily="49" charset="0"/>
+              <a:cs typeface="Courier New" panose="02070309020205020404" pitchFamily="49" charset="0"/>
+              <a:sym typeface="Helvetica"/>
+            </a:endParaRPr>
+          </a:p>
+        </p:txBody>
+      </p:sp>
+      <p:pic>
+        <p:nvPicPr>
+          <p:cNvPr id="4" name="Obraz 3">
+            <a:extLst>
+              <a:ext uri="{FF2B5EF4-FFF2-40B4-BE49-F238E27FC236}">
+                <a16:creationId xmlns:a16="http://schemas.microsoft.com/office/drawing/2014/main" id="{2229B93B-1F9B-4D78-B945-FE2683ED0671}"/>
+              </a:ext>
+            </a:extLst>
+          </p:cNvPr>
+          <p:cNvPicPr>
+            <a:picLocks noChangeAspect="1"/>
+          </p:cNvPicPr>
+          <p:nvPr/>
+        </p:nvPicPr>
+        <p:blipFill>
+          <a:blip r:embed="rId2"/>
+          <a:stretch>
+            <a:fillRect/>
+          </a:stretch>
+        </p:blipFill>
+        <p:spPr>
+          <a:xfrm>
+            <a:off x="1376362" y="3213805"/>
+            <a:ext cx="3686706" cy="2842153"/>
+          </a:xfrm>
+          <a:prstGeom prst="rect">
+            <a:avLst/>
+          </a:prstGeom>
+        </p:spPr>
+      </p:pic>
+    </p:spTree>
+    <p:extLst>
+      <p:ext uri="{BB962C8B-B14F-4D97-AF65-F5344CB8AC3E}">
+        <p14:creationId xmlns:p14="http://schemas.microsoft.com/office/powerpoint/2010/main" val="3518630866"/>
+      </p:ext>
+    </p:extLst>
+  </p:cSld>
+  <p:clrMapOvr>
+    <a:masterClrMapping/>
+  </p:clrMapOvr>
+  <p:transition spd="med"/>
+</p:sld>
+</file>
+
+<file path=ppt/slides/slide13.xml><?xml version="1.0" encoding="utf-8"?>
+<p:sld xmlns:a="http://schemas.openxmlformats.org/drawingml/2006/main" xmlns:r="http://schemas.openxmlformats.org/officeDocument/2006/relationships" xmlns:p="http://schemas.openxmlformats.org/presentationml/2006/main">
+  <p:cSld>
+    <p:spTree>
+      <p:nvGrpSpPr>
+        <p:cNvPr id="1" name=""/>
+        <p:cNvGrpSpPr/>
+        <p:nvPr/>
+      </p:nvGrpSpPr>
+      <p:grpSpPr>
+        <a:xfrm>
+          <a:off x="0" y="0"/>
+          <a:ext cx="0" cy="0"/>
+          <a:chOff x="0" y="0"/>
+          <a:chExt cx="0" cy="0"/>
+        </a:xfrm>
+      </p:grpSpPr>
+      <p:sp>
+        <p:nvSpPr>
+          <p:cNvPr id="2" name="Tytuł 1">
+            <a:extLst>
+              <a:ext uri="{FF2B5EF4-FFF2-40B4-BE49-F238E27FC236}">
+                <a16:creationId xmlns:a16="http://schemas.microsoft.com/office/drawing/2014/main" id="{8364433E-D632-40D1-B3C1-66B59A0B44E8}"/>
+              </a:ext>
+            </a:extLst>
+          </p:cNvPr>
+          <p:cNvSpPr>
+            <a:spLocks noGrp="1"/>
+          </p:cNvSpPr>
+          <p:nvPr>
+            <p:ph type="title"/>
+          </p:nvPr>
+        </p:nvSpPr>
+        <p:spPr>
+          <a:xfrm>
+            <a:off x="761999" y="304465"/>
+            <a:ext cx="8483007" cy="546829"/>
+          </a:xfrm>
+        </p:spPr>
+        <p:txBody>
+          <a:bodyPr>
+            <a:normAutofit fontScale="90000"/>
+          </a:bodyPr>
+          <a:lstStyle/>
+          <a:p>
+            <a:pPr algn="l"/>
+            <a:r>
+              <a:rPr lang="pl-PL" sz="3600" dirty="0"/>
+              <a:t>JSON</a:t>
+            </a:r>
+            <a:r>
+              <a:rPr lang="en-GB" sz="3600" dirty="0"/>
+              <a:t> Generator – </a:t>
+            </a:r>
+            <a:r>
               <a:rPr lang="pl-PL" sz="3600" dirty="0" err="1"/>
               <a:t>Typical</a:t>
             </a:r>
@@ -7660,7 +8739,7 @@
 </p:sld>
 </file>
 
-<file path=ppt/slides/slide13.xml><?xml version="1.0" encoding="utf-8"?>
+<file path=ppt/slides/slide14.xml><?xml version="1.0" encoding="utf-8"?>
 <p:sld xmlns:a="http://schemas.openxmlformats.org/drawingml/2006/main" xmlns:r="http://schemas.openxmlformats.org/officeDocument/2006/relationships" xmlns:p="http://schemas.openxmlformats.org/presentationml/2006/main">
   <p:cSld>
     <p:spTree>
@@ -7765,7 +8844,7 @@
 </p:sld>
 </file>
 
-<file path=ppt/slides/slide14.xml><?xml version="1.0" encoding="utf-8"?>
+<file path=ppt/slides/slide15.xml><?xml version="1.0" encoding="utf-8"?>
 <p:sld xmlns:a="http://schemas.openxmlformats.org/drawingml/2006/main" xmlns:r="http://schemas.openxmlformats.org/officeDocument/2006/relationships" xmlns:p="http://schemas.openxmlformats.org/presentationml/2006/main">
   <p:cSld>
     <p:spTree>
@@ -7882,7 +8961,7 @@
 </p:sld>
 </file>
 
-<file path=ppt/slides/slide15.xml><?xml version="1.0" encoding="utf-8"?>
+<file path=ppt/slides/slide16.xml><?xml version="1.0" encoding="utf-8"?>
 <p:sld xmlns:a="http://schemas.openxmlformats.org/drawingml/2006/main" xmlns:r="http://schemas.openxmlformats.org/officeDocument/2006/relationships" xmlns:p="http://schemas.openxmlformats.org/presentationml/2006/main">
   <p:cSld>
     <p:spTree>
@@ -7995,7 +9074,7 @@
 </p:sld>
 </file>
 
-<file path=ppt/slides/slide16.xml><?xml version="1.0" encoding="utf-8"?>
+<file path=ppt/slides/slide17.xml><?xml version="1.0" encoding="utf-8"?>
 <p:sld xmlns:a="http://schemas.openxmlformats.org/drawingml/2006/main" xmlns:r="http://schemas.openxmlformats.org/officeDocument/2006/relationships" xmlns:p="http://schemas.openxmlformats.org/presentationml/2006/main">
   <p:cSld>
     <p:spTree>
@@ -8112,7 +9191,7 @@
 </p:sld>
 </file>
 
-<file path=ppt/slides/slide17.xml><?xml version="1.0" encoding="utf-8"?>
+<file path=ppt/slides/slide18.xml><?xml version="1.0" encoding="utf-8"?>
 <p:sld xmlns:a="http://schemas.openxmlformats.org/drawingml/2006/main" xmlns:r="http://schemas.openxmlformats.org/officeDocument/2006/relationships" xmlns:p="http://schemas.openxmlformats.org/presentationml/2006/main">
   <p:cSld>
     <p:spTree>
@@ -8957,7 +10036,7 @@
               <a:t>predefined</a:t>
             </a:r>
             <a:r>
-              <a:rPr lang="pl-PL" sz="2000" dirty="0">
+              <a:rPr lang="pl-PL" sz="2000">
                 <a:solidFill>
                   <a:schemeClr val="tx2">
                     <a:lumMod val="10000"/>
@@ -9984,7 +11063,7 @@
         </p:nvSpPr>
         <p:spPr>
           <a:xfrm>
-            <a:off x="761999" y="1198485"/>
+            <a:off x="761999" y="1075719"/>
             <a:ext cx="10329333" cy="5134582"/>
           </a:xfrm>
           <a:prstGeom prst="rect">
@@ -10186,7 +11265,29 @@
                 <a:cs typeface="Courier New" panose="02070309020205020404" pitchFamily="49" charset="0"/>
                 <a:sym typeface="Helvetica"/>
               </a:rPr>
-              <a:t>usage: JsonGenerator.py [-h] [--version] [-d] [-c] [-s] [-o DIR]</a:t>
+              <a:t>usage: JsonGenerator.py [-h] [--version] [-d] [-c] [-s] [-</a:t>
+            </a:r>
+            <a:r>
+              <a:rPr lang="en-GB" sz="1300" kern="0" spc="0" dirty="0" err="1">
+                <a:solidFill>
+                  <a:srgbClr val="000000"/>
+                </a:solidFill>
+                <a:latin typeface="Courier New" panose="02070309020205020404" pitchFamily="49" charset="0"/>
+                <a:cs typeface="Courier New" panose="02070309020205020404" pitchFamily="49" charset="0"/>
+                <a:sym typeface="Helvetica"/>
+              </a:rPr>
+              <a:t>i</a:t>
+            </a:r>
+            <a:r>
+              <a:rPr lang="en-GB" sz="1300" kern="0" spc="0" dirty="0">
+                <a:solidFill>
+                  <a:srgbClr val="000000"/>
+                </a:solidFill>
+                <a:latin typeface="Courier New" panose="02070309020205020404" pitchFamily="49" charset="0"/>
+                <a:cs typeface="Courier New" panose="02070309020205020404" pitchFamily="49" charset="0"/>
+                <a:sym typeface="Helvetica"/>
+              </a:rPr>
+              <a:t> DIR] [-o DIR]</a:t>
             </a:r>
           </a:p>
           <a:p>
@@ -10590,8 +11691,104 @@
                 <a:cs typeface="Courier New" panose="02070309020205020404" pitchFamily="49" charset="0"/>
                 <a:sym typeface="Helvetica"/>
               </a:rPr>
-              <a:t>  -o DIR, --output DIR  output directory (default: output in the same directory as the source json)</a:t>
-            </a:r>
+              <a:t>  -</a:t>
+            </a:r>
+            <a:r>
+              <a:rPr lang="en-GB" sz="1300" kern="0" spc="0" dirty="0" err="1">
+                <a:solidFill>
+                  <a:srgbClr val="000000"/>
+                </a:solidFill>
+                <a:latin typeface="Courier New" panose="02070309020205020404" pitchFamily="49" charset="0"/>
+                <a:cs typeface="Courier New" panose="02070309020205020404" pitchFamily="49" charset="0"/>
+                <a:sym typeface="Helvetica"/>
+              </a:rPr>
+              <a:t>i</a:t>
+            </a:r>
+            <a:r>
+              <a:rPr lang="en-GB" sz="1300" kern="0" spc="0" dirty="0">
+                <a:solidFill>
+                  <a:srgbClr val="000000"/>
+                </a:solidFill>
+                <a:latin typeface="Courier New" panose="02070309020205020404" pitchFamily="49" charset="0"/>
+                <a:cs typeface="Courier New" panose="02070309020205020404" pitchFamily="49" charset="0"/>
+                <a:sym typeface="Helvetica"/>
+              </a:rPr>
+              <a:t> DIR, --</a:t>
+            </a:r>
+            <a:r>
+              <a:rPr lang="en-GB" sz="1300" kern="0" spc="0" dirty="0" err="1">
+                <a:solidFill>
+                  <a:srgbClr val="000000"/>
+                </a:solidFill>
+                <a:latin typeface="Courier New" panose="02070309020205020404" pitchFamily="49" charset="0"/>
+                <a:cs typeface="Courier New" panose="02070309020205020404" pitchFamily="49" charset="0"/>
+                <a:sym typeface="Helvetica"/>
+              </a:rPr>
+              <a:t>ifdir</a:t>
+            </a:r>
+            <a:r>
+              <a:rPr lang="en-GB" sz="1300" kern="0" spc="0" dirty="0">
+                <a:solidFill>
+                  <a:srgbClr val="000000"/>
+                </a:solidFill>
+                <a:latin typeface="Courier New" panose="02070309020205020404" pitchFamily="49" charset="0"/>
+                <a:cs typeface="Courier New" panose="02070309020205020404" pitchFamily="49" charset="0"/>
+                <a:sym typeface="Helvetica"/>
+              </a:rPr>
+              <a:t> DIR   for </a:t>
+            </a:r>
+            <a:r>
+              <a:rPr lang="pl-PL" sz="1300" kern="0" spc="0" dirty="0">
+                <a:solidFill>
+                  <a:srgbClr val="000000"/>
+                </a:solidFill>
+                <a:latin typeface="Courier New" panose="02070309020205020404" pitchFamily="49" charset="0"/>
+                <a:cs typeface="Courier New" panose="02070309020205020404" pitchFamily="49" charset="0"/>
+                <a:sym typeface="Helvetica"/>
+              </a:rPr>
+              <a:t>’</a:t>
+            </a:r>
+            <a:r>
+              <a:rPr lang="pl-PL" sz="1300" kern="0" spc="0" dirty="0" err="1">
+                <a:solidFill>
+                  <a:srgbClr val="000000"/>
+                </a:solidFill>
+                <a:latin typeface="Courier New" panose="02070309020205020404" pitchFamily="49" charset="0"/>
+                <a:cs typeface="Courier New" panose="02070309020205020404" pitchFamily="49" charset="0"/>
+                <a:sym typeface="Helvetica"/>
+              </a:rPr>
+              <a:t>interface</a:t>
+            </a:r>
+            <a:r>
+              <a:rPr lang="pl-PL" sz="1300" kern="0" spc="0" dirty="0">
+                <a:solidFill>
+                  <a:srgbClr val="000000"/>
+                </a:solidFill>
+                <a:latin typeface="Courier New" panose="02070309020205020404" pitchFamily="49" charset="0"/>
+                <a:cs typeface="Courier New" panose="02070309020205020404" pitchFamily="49" charset="0"/>
+                <a:sym typeface="Helvetica"/>
+              </a:rPr>
+              <a:t>’</a:t>
+            </a:r>
+            <a:r>
+              <a:rPr lang="en-GB" sz="1300" kern="0" spc="0" dirty="0">
+                <a:solidFill>
+                  <a:srgbClr val="000000"/>
+                </a:solidFill>
+                <a:latin typeface="Courier New" panose="02070309020205020404" pitchFamily="49" charset="0"/>
+                <a:cs typeface="Courier New" panose="02070309020205020404" pitchFamily="49" charset="0"/>
+                <a:sym typeface="Helvetica"/>
+              </a:rPr>
+              <a:t> directive, a directory with API interfaces (default: same </a:t>
+            </a:r>
+            <a:endParaRPr lang="pl-PL" sz="1300" kern="0" spc="0" dirty="0">
+              <a:solidFill>
+                <a:srgbClr val="000000"/>
+              </a:solidFill>
+              <a:latin typeface="Courier New" panose="02070309020205020404" pitchFamily="49" charset="0"/>
+              <a:cs typeface="Courier New" panose="02070309020205020404" pitchFamily="49" charset="0"/>
+              <a:sym typeface="Helvetica"/>
+            </a:endParaRPr>
           </a:p>
           <a:p>
             <a:pPr marL="0" indent="0" defTabSz="412750" latinLnBrk="1" hangingPunct="0">
@@ -10605,7 +11802,7 @@
               <a:buNone/>
             </a:pPr>
             <a:r>
-              <a:rPr lang="en-GB" sz="1300" kern="0" spc="0" dirty="0">
+              <a:rPr lang="pl-PL" sz="1300" kern="0" spc="0" dirty="0">
                 <a:solidFill>
                   <a:srgbClr val="000000"/>
                 </a:solidFill>
@@ -10613,7 +11810,51 @@
                 <a:cs typeface="Courier New" panose="02070309020205020404" pitchFamily="49" charset="0"/>
                 <a:sym typeface="Helvetica"/>
               </a:rPr>
-              <a:t>  --indent SIZE         code indentation in spaces (default: 4)</a:t>
+              <a:t>					   </a:t>
+            </a:r>
+            <a:r>
+              <a:rPr lang="en-GB" sz="1300" kern="0" spc="0" dirty="0">
+                <a:solidFill>
+                  <a:srgbClr val="000000"/>
+                </a:solidFill>
+                <a:latin typeface="Courier New" panose="02070309020205020404" pitchFamily="49" charset="0"/>
+                <a:cs typeface="Courier New" panose="02070309020205020404" pitchFamily="49" charset="0"/>
+                <a:sym typeface="Helvetica"/>
+              </a:rPr>
+              <a:t>direct</a:t>
+            </a:r>
+            <a:r>
+              <a:rPr lang="pl-PL" sz="1300" kern="0" spc="0" dirty="0">
+                <a:solidFill>
+                  <a:srgbClr val="000000"/>
+                </a:solidFill>
+                <a:latin typeface="Courier New" panose="02070309020205020404" pitchFamily="49" charset="0"/>
+                <a:cs typeface="Courier New" panose="02070309020205020404" pitchFamily="49" charset="0"/>
+                <a:sym typeface="Helvetica"/>
+              </a:rPr>
+              <a:t>o</a:t>
+            </a:r>
+            <a:r>
+              <a:rPr lang="en-GB" sz="1300" kern="0" spc="0" dirty="0" err="1">
+                <a:solidFill>
+                  <a:srgbClr val="000000"/>
+                </a:solidFill>
+                <a:latin typeface="Courier New" panose="02070309020205020404" pitchFamily="49" charset="0"/>
+                <a:cs typeface="Courier New" panose="02070309020205020404" pitchFamily="49" charset="0"/>
+                <a:sym typeface="Helvetica"/>
+              </a:rPr>
+              <a:t>ry</a:t>
+            </a:r>
+            <a:r>
+              <a:rPr lang="en-GB" sz="1300" kern="0" spc="0" dirty="0">
+                <a:solidFill>
+                  <a:srgbClr val="000000"/>
+                </a:solidFill>
+                <a:latin typeface="Courier New" panose="02070309020205020404" pitchFamily="49" charset="0"/>
+                <a:cs typeface="Courier New" panose="02070309020205020404" pitchFamily="49" charset="0"/>
+                <a:sym typeface="Helvetica"/>
+              </a:rPr>
+              <a:t> as source file)</a:t>
             </a:r>
           </a:p>
           <a:p>
@@ -10636,10 +11877,22 @@
                 <a:cs typeface="Courier New" panose="02070309020205020404" pitchFamily="49" charset="0"/>
                 <a:sym typeface="Helvetica"/>
               </a:rPr>
-              <a:t>  --copy-</a:t>
-            </a:r>
-            <a:r>
-              <a:rPr lang="en-GB" sz="1300" kern="0" spc="0" dirty="0" err="1">
+              <a:t>  -o DIR, --output DIR  output directory (default: output in the same directory as the source json)</a:t>
+            </a:r>
+          </a:p>
+          <a:p>
+            <a:pPr marL="0" indent="0" defTabSz="412750" latinLnBrk="1" hangingPunct="0">
+              <a:lnSpc>
+                <a:spcPct val="100000"/>
+              </a:lnSpc>
+              <a:spcBef>
+                <a:spcPts val="0"/>
+              </a:spcBef>
+              <a:buSzTx/>
+              <a:buNone/>
+            </a:pPr>
+            <a:r>
+              <a:rPr lang="en-GB" sz="1300" kern="0" spc="0" dirty="0">
                 <a:solidFill>
                   <a:srgbClr val="000000"/>
                 </a:solidFill>
@@ -10647,8 +11900,20 @@
                 <a:cs typeface="Courier New" panose="02070309020205020404" pitchFamily="49" charset="0"/>
                 <a:sym typeface="Helvetica"/>
               </a:rPr>
-              <a:t>ctor</a:t>
-            </a:r>
+              <a:t>  --indent SIZE         code indentation in spaces (default: 4)</a:t>
+            </a:r>
+          </a:p>
+          <a:p>
+            <a:pPr marL="0" indent="0" defTabSz="412750" latinLnBrk="1" hangingPunct="0">
+              <a:lnSpc>
+                <a:spcPct val="100000"/>
+              </a:lnSpc>
+              <a:spcBef>
+                <a:spcPts val="0"/>
+              </a:spcBef>
+              <a:buSzTx/>
+              <a:buNone/>
+            </a:pPr>
             <a:r>
               <a:rPr lang="en-GB" sz="1300" kern="0" spc="0" dirty="0">
                 <a:solidFill>
@@ -10658,7 +11923,71 @@
                 <a:cs typeface="Courier New" panose="02070309020205020404" pitchFamily="49" charset="0"/>
                 <a:sym typeface="Helvetica"/>
               </a:rPr>
-              <a:t>           always emit a copy constructor and assignment operator for a class (default: emit only when it appears to be needed)</a:t>
+              <a:t>  --copy-</a:t>
+            </a:r>
+            <a:r>
+              <a:rPr lang="en-GB" sz="1300" kern="0" spc="0" dirty="0" err="1">
+                <a:solidFill>
+                  <a:srgbClr val="000000"/>
+                </a:solidFill>
+                <a:latin typeface="Courier New" panose="02070309020205020404" pitchFamily="49" charset="0"/>
+                <a:cs typeface="Courier New" panose="02070309020205020404" pitchFamily="49" charset="0"/>
+                <a:sym typeface="Helvetica"/>
+              </a:rPr>
+              <a:t>ctor</a:t>
+            </a:r>
+            <a:r>
+              <a:rPr lang="en-GB" sz="1300" kern="0" spc="0" dirty="0">
+                <a:solidFill>
+                  <a:srgbClr val="000000"/>
+                </a:solidFill>
+                <a:latin typeface="Courier New" panose="02070309020205020404" pitchFamily="49" charset="0"/>
+                <a:cs typeface="Courier New" panose="02070309020205020404" pitchFamily="49" charset="0"/>
+                <a:sym typeface="Helvetica"/>
+              </a:rPr>
+              <a:t>           always emit a copy constructor and assignment operator for a class </a:t>
+            </a:r>
+            <a:endParaRPr lang="pl-PL" sz="1300" kern="0" spc="0" dirty="0">
+              <a:solidFill>
+                <a:srgbClr val="000000"/>
+              </a:solidFill>
+              <a:latin typeface="Courier New" panose="02070309020205020404" pitchFamily="49" charset="0"/>
+              <a:cs typeface="Courier New" panose="02070309020205020404" pitchFamily="49" charset="0"/>
+              <a:sym typeface="Helvetica"/>
+            </a:endParaRPr>
+          </a:p>
+          <a:p>
+            <a:pPr marL="0" indent="0" defTabSz="412750" latinLnBrk="1" hangingPunct="0">
+              <a:lnSpc>
+                <a:spcPct val="100000"/>
+              </a:lnSpc>
+              <a:spcBef>
+                <a:spcPts val="0"/>
+              </a:spcBef>
+              <a:buSzTx/>
+              <a:buNone/>
+            </a:pPr>
+            <a:r>
+              <a:rPr lang="pl-PL" sz="1300" kern="0" spc="0" dirty="0">
+                <a:solidFill>
+                  <a:srgbClr val="000000"/>
+                </a:solidFill>
+                <a:latin typeface="Courier New" panose="02070309020205020404" pitchFamily="49" charset="0"/>
+                <a:cs typeface="Courier New" panose="02070309020205020404" pitchFamily="49" charset="0"/>
+                <a:sym typeface="Helvetica"/>
+              </a:rPr>
+              <a:t>					   </a:t>
+            </a:r>
+            <a:r>
+              <a:rPr lang="en-GB" sz="1300" kern="0" spc="0" dirty="0">
+                <a:solidFill>
+                  <a:srgbClr val="000000"/>
+                </a:solidFill>
+                <a:latin typeface="Courier New" panose="02070309020205020404" pitchFamily="49" charset="0"/>
+                <a:cs typeface="Courier New" panose="02070309020205020404" pitchFamily="49" charset="0"/>
+                <a:sym typeface="Helvetica"/>
+              </a:rPr>
+              <a:t>(default: emit only when it appears to be needed)</a:t>
             </a:r>
           </a:p>
           <a:p>
@@ -11068,29 +12397,40 @@
               <a:t>Generate </a:t>
             </a:r>
             <a:r>
-              <a:rPr lang="pl-PL" sz="2000" kern="0" spc="0" dirty="0">
-                <a:solidFill>
-                  <a:srgbClr val="000000"/>
-                </a:solidFill>
-                <a:latin typeface="Calibri" panose="020F0502020204030204" pitchFamily="34" charset="0"/>
-                <a:cs typeface="Calibri" panose="020F0502020204030204" pitchFamily="34" charset="0"/>
-                <a:sym typeface="Helvetica"/>
-              </a:rPr>
-              <a:t>JSON-RPC </a:t>
-            </a:r>
-            <a:r>
-              <a:rPr lang="pl-PL" sz="2000" kern="0" spc="0" dirty="0" err="1">
-                <a:solidFill>
-                  <a:srgbClr val="000000"/>
-                </a:solidFill>
-                <a:latin typeface="Calibri" panose="020F0502020204030204" pitchFamily="34" charset="0"/>
-                <a:cs typeface="Calibri" panose="020F0502020204030204" pitchFamily="34" charset="0"/>
-                <a:sym typeface="Helvetica"/>
-              </a:rPr>
-              <a:t>interface</a:t>
-            </a:r>
-            <a:r>
-              <a:rPr lang="pl-PL" sz="2000" kern="0" spc="0" dirty="0">
+              <a:rPr lang="pl-PL" sz="2000" kern="0" spc="0" dirty="0" err="1">
+                <a:solidFill>
+                  <a:srgbClr val="000000"/>
+                </a:solidFill>
+                <a:latin typeface="Calibri" panose="020F0502020204030204" pitchFamily="34" charset="0"/>
+                <a:cs typeface="Calibri" panose="020F0502020204030204" pitchFamily="34" charset="0"/>
+                <a:sym typeface="Helvetica"/>
+              </a:rPr>
+              <a:t>documenatation</a:t>
+            </a:r>
+            <a:r>
+              <a:rPr lang="en-GB" sz="2000" kern="0" spc="0" dirty="0">
+                <a:solidFill>
+                  <a:srgbClr val="000000"/>
+                </a:solidFill>
+                <a:latin typeface="Calibri" panose="020F0502020204030204" pitchFamily="34" charset="0"/>
+                <a:cs typeface="Calibri" panose="020F0502020204030204" pitchFamily="34" charset="0"/>
+                <a:sym typeface="Helvetica"/>
+              </a:rPr>
+              <a:t> for </a:t>
+            </a:r>
+            <a:r>
+              <a:rPr lang="pl-PL" sz="2000" i="1" kern="0" spc="0" dirty="0" err="1">
+                <a:solidFill>
+                  <a:srgbClr val="000000"/>
+                </a:solidFill>
+                <a:latin typeface="Calibri" panose="020F0502020204030204" pitchFamily="34" charset="0"/>
+                <a:cs typeface="Calibri" panose="020F0502020204030204" pitchFamily="34" charset="0"/>
+                <a:sym typeface="Helvetica"/>
+              </a:rPr>
+              <a:t>WebKitBrowser</a:t>
+            </a:r>
+            <a:r>
+              <a:rPr lang="en-GB" sz="2000" kern="0" spc="0" dirty="0">
                 <a:solidFill>
                   <a:srgbClr val="000000"/>
                 </a:solidFill>
@@ -11109,38 +12449,96 @@
                 <a:cs typeface="Calibri" panose="020F0502020204030204" pitchFamily="34" charset="0"/>
                 <a:sym typeface="Helvetica"/>
               </a:rPr>
-              <a:t>documenatation</a:t>
-            </a:r>
-            <a:r>
-              <a:rPr lang="en-GB" sz="2000" kern="0" spc="0" dirty="0">
-                <a:solidFill>
-                  <a:srgbClr val="000000"/>
-                </a:solidFill>
-                <a:latin typeface="Calibri" panose="020F0502020204030204" pitchFamily="34" charset="0"/>
-                <a:cs typeface="Calibri" panose="020F0502020204030204" pitchFamily="34" charset="0"/>
-                <a:sym typeface="Helvetica"/>
-              </a:rPr>
-              <a:t> for </a:t>
-            </a:r>
-            <a:r>
-              <a:rPr lang="pl-PL" sz="2000" i="1" kern="0" spc="0" dirty="0" err="1">
-                <a:solidFill>
-                  <a:srgbClr val="000000"/>
-                </a:solidFill>
-                <a:latin typeface="Calibri" panose="020F0502020204030204" pitchFamily="34" charset="0"/>
-                <a:cs typeface="Calibri" panose="020F0502020204030204" pitchFamily="34" charset="0"/>
-                <a:sym typeface="Helvetica"/>
-              </a:rPr>
-              <a:t>WebKitBrowser</a:t>
-            </a:r>
-            <a:endParaRPr lang="pl-PL" sz="2000" kern="0" spc="0" dirty="0">
-              <a:solidFill>
-                <a:srgbClr val="000000"/>
-              </a:solidFill>
-              <a:latin typeface="Calibri" panose="020F0502020204030204" pitchFamily="34" charset="0"/>
-              <a:cs typeface="Calibri" panose="020F0502020204030204" pitchFamily="34" charset="0"/>
-              <a:sym typeface="Helvetica"/>
-            </a:endParaRPr>
+              <a:t>plugin</a:t>
+            </a:r>
+            <a:r>
+              <a:rPr lang="pl-PL" sz="2000" kern="0" spc="0" dirty="0">
+                <a:solidFill>
+                  <a:srgbClr val="000000"/>
+                </a:solidFill>
+                <a:latin typeface="Calibri" panose="020F0502020204030204" pitchFamily="34" charset="0"/>
+                <a:cs typeface="Calibri" panose="020F0502020204030204" pitchFamily="34" charset="0"/>
+                <a:sym typeface="Helvetica"/>
+              </a:rPr>
+              <a:t> </a:t>
+            </a:r>
+            <a:r>
+              <a:rPr lang="pl-PL" sz="1600" i="1" kern="0" spc="0" dirty="0">
+                <a:solidFill>
+                  <a:srgbClr val="000000"/>
+                </a:solidFill>
+                <a:latin typeface="Calibri" panose="020F0502020204030204" pitchFamily="34" charset="0"/>
+                <a:cs typeface="Calibri" panose="020F0502020204030204" pitchFamily="34" charset="0"/>
+                <a:sym typeface="Helvetica"/>
+              </a:rPr>
+              <a:t>(</a:t>
+            </a:r>
+            <a:r>
+              <a:rPr lang="pl-PL" sz="1600" i="1" kern="0" spc="0" dirty="0" err="1">
+                <a:solidFill>
+                  <a:srgbClr val="000000"/>
+                </a:solidFill>
+                <a:latin typeface="Calibri" panose="020F0502020204030204" pitchFamily="34" charset="0"/>
+                <a:cs typeface="Calibri" panose="020F0502020204030204" pitchFamily="34" charset="0"/>
+                <a:sym typeface="Helvetica"/>
+              </a:rPr>
+              <a:t>all</a:t>
+            </a:r>
+            <a:r>
+              <a:rPr lang="pl-PL" sz="1600" i="1" kern="0" spc="0" dirty="0">
+                <a:solidFill>
+                  <a:srgbClr val="000000"/>
+                </a:solidFill>
+                <a:latin typeface="Calibri" panose="020F0502020204030204" pitchFamily="34" charset="0"/>
+                <a:cs typeface="Calibri" panose="020F0502020204030204" pitchFamily="34" charset="0"/>
+                <a:sym typeface="Helvetica"/>
+              </a:rPr>
+              <a:t> JSON </a:t>
+            </a:r>
+            <a:r>
+              <a:rPr lang="pl-PL" sz="1600" i="1" kern="0" spc="0" dirty="0" err="1">
+                <a:solidFill>
+                  <a:srgbClr val="000000"/>
+                </a:solidFill>
+                <a:latin typeface="Calibri" panose="020F0502020204030204" pitchFamily="34" charset="0"/>
+                <a:cs typeface="Calibri" panose="020F0502020204030204" pitchFamily="34" charset="0"/>
+                <a:sym typeface="Helvetica"/>
+              </a:rPr>
+              <a:t>files</a:t>
+            </a:r>
+            <a:r>
+              <a:rPr lang="pl-PL" sz="1600" i="1" kern="0" spc="0" dirty="0">
+                <a:solidFill>
+                  <a:srgbClr val="000000"/>
+                </a:solidFill>
+                <a:latin typeface="Calibri" panose="020F0502020204030204" pitchFamily="34" charset="0"/>
+                <a:cs typeface="Calibri" panose="020F0502020204030204" pitchFamily="34" charset="0"/>
+                <a:sym typeface="Helvetica"/>
+              </a:rPr>
+              <a:t> in same </a:t>
+            </a:r>
+            <a:r>
+              <a:rPr lang="pl-PL" sz="1600" i="1" kern="0" spc="0" dirty="0" err="1">
+                <a:solidFill>
+                  <a:srgbClr val="000000"/>
+                </a:solidFill>
+                <a:latin typeface="Calibri" panose="020F0502020204030204" pitchFamily="34" charset="0"/>
+                <a:cs typeface="Calibri" panose="020F0502020204030204" pitchFamily="34" charset="0"/>
+                <a:sym typeface="Helvetica"/>
+              </a:rPr>
+              <a:t>directory</a:t>
+            </a:r>
+            <a:r>
+              <a:rPr lang="pl-PL" sz="1600" i="1" kern="0" spc="0" dirty="0">
+                <a:solidFill>
+                  <a:srgbClr val="000000"/>
+                </a:solidFill>
+                <a:latin typeface="Calibri" panose="020F0502020204030204" pitchFamily="34" charset="0"/>
+                <a:cs typeface="Calibri" panose="020F0502020204030204" pitchFamily="34" charset="0"/>
+                <a:sym typeface="Helvetica"/>
+              </a:rPr>
+              <a:t>)</a:t>
+            </a:r>
           </a:p>
           <a:p>
             <a:pPr marL="0" indent="0" defTabSz="412750" latinLnBrk="1" hangingPunct="0">
@@ -11228,7 +12626,7 @@
                 <a:cs typeface="Courier New" panose="02070309020205020404" pitchFamily="49" charset="0"/>
                 <a:sym typeface="Helvetica"/>
               </a:rPr>
-              <a:t>WebKitBrowserAPI.json</a:t>
+              <a:t>WebKitBrowserPlugin.json</a:t>
             </a:r>
             <a:endParaRPr lang="pl-PL" sz="1800" kern="0" spc="0" dirty="0">
               <a:solidFill>
@@ -11336,12 +12734,166 @@
               </a:rPr>
               <a:t>plugin</a:t>
             </a:r>
-            <a:endParaRPr lang="pl-PL" sz="2000" kern="0" spc="0" dirty="0">
+            <a:r>
+              <a:rPr lang="pl-PL" sz="2000" kern="0" spc="0" dirty="0">
+                <a:solidFill>
+                  <a:srgbClr val="000000"/>
+                </a:solidFill>
+                <a:latin typeface="Calibri" panose="020F0502020204030204" pitchFamily="34" charset="0"/>
+                <a:cs typeface="Calibri" panose="020F0502020204030204" pitchFamily="34" charset="0"/>
+                <a:sym typeface="Helvetica"/>
+              </a:rPr>
+              <a:t>, </a:t>
+            </a:r>
+            <a:r>
+              <a:rPr lang="pl-PL" sz="2000" kern="0" spc="0" dirty="0" err="1">
+                <a:solidFill>
+                  <a:srgbClr val="000000"/>
+                </a:solidFill>
+                <a:latin typeface="Calibri" panose="020F0502020204030204" pitchFamily="34" charset="0"/>
+                <a:cs typeface="Calibri" panose="020F0502020204030204" pitchFamily="34" charset="0"/>
+                <a:sym typeface="Helvetica"/>
+              </a:rPr>
+              <a:t>specifying</a:t>
+            </a:r>
+            <a:r>
+              <a:rPr lang="pl-PL" sz="2000" kern="0" spc="0" dirty="0">
+                <a:solidFill>
+                  <a:srgbClr val="000000"/>
+                </a:solidFill>
+                <a:latin typeface="Calibri" panose="020F0502020204030204" pitchFamily="34" charset="0"/>
+                <a:cs typeface="Calibri" panose="020F0502020204030204" pitchFamily="34" charset="0"/>
+                <a:sym typeface="Helvetica"/>
+              </a:rPr>
+              <a:t> </a:t>
+            </a:r>
+            <a:r>
+              <a:rPr lang="pl-PL" sz="2000" kern="0" spc="0" dirty="0" err="1">
+                <a:solidFill>
+                  <a:srgbClr val="000000"/>
+                </a:solidFill>
+                <a:latin typeface="Calibri" panose="020F0502020204030204" pitchFamily="34" charset="0"/>
+                <a:cs typeface="Calibri" panose="020F0502020204030204" pitchFamily="34" charset="0"/>
+                <a:sym typeface="Helvetica"/>
+              </a:rPr>
+              <a:t>interface</a:t>
+            </a:r>
+            <a:r>
+              <a:rPr lang="pl-PL" sz="2000" kern="0" spc="0" dirty="0">
+                <a:solidFill>
+                  <a:srgbClr val="000000"/>
+                </a:solidFill>
+                <a:latin typeface="Calibri" panose="020F0502020204030204" pitchFamily="34" charset="0"/>
+                <a:cs typeface="Calibri" panose="020F0502020204030204" pitchFamily="34" charset="0"/>
+                <a:sym typeface="Helvetica"/>
+              </a:rPr>
+              <a:t> </a:t>
+            </a:r>
+            <a:r>
+              <a:rPr lang="pl-PL" sz="2000" kern="0" spc="0" dirty="0" err="1">
+                <a:solidFill>
+                  <a:srgbClr val="000000"/>
+                </a:solidFill>
+                <a:latin typeface="Calibri" panose="020F0502020204030204" pitchFamily="34" charset="0"/>
+                <a:cs typeface="Calibri" panose="020F0502020204030204" pitchFamily="34" charset="0"/>
+                <a:sym typeface="Helvetica"/>
+              </a:rPr>
+              <a:t>directory</a:t>
+            </a:r>
+            <a:r>
+              <a:rPr lang="pl-PL" sz="2000" kern="0" spc="0" dirty="0">
+                <a:solidFill>
+                  <a:srgbClr val="000000"/>
+                </a:solidFill>
+                <a:latin typeface="Calibri" panose="020F0502020204030204" pitchFamily="34" charset="0"/>
+                <a:cs typeface="Calibri" panose="020F0502020204030204" pitchFamily="34" charset="0"/>
+                <a:sym typeface="Helvetica"/>
+              </a:rPr>
+              <a:t>  </a:t>
+            </a:r>
+            <a:r>
+              <a:rPr lang="pl-PL" sz="1600" i="1" kern="0" spc="0" dirty="0">
+                <a:solidFill>
+                  <a:srgbClr val="000000"/>
+                </a:solidFill>
+                <a:latin typeface="Calibri" panose="020F0502020204030204" pitchFamily="34" charset="0"/>
+                <a:cs typeface="Calibri" panose="020F0502020204030204" pitchFamily="34" charset="0"/>
+                <a:sym typeface="Helvetica"/>
+              </a:rPr>
+              <a:t>(</a:t>
+            </a:r>
+            <a:r>
+              <a:rPr lang="pl-PL" sz="1600" i="1" kern="0" spc="0" dirty="0" err="1">
+                <a:solidFill>
+                  <a:srgbClr val="000000"/>
+                </a:solidFill>
+                <a:latin typeface="Calibri" panose="020F0502020204030204" pitchFamily="34" charset="0"/>
+                <a:cs typeface="Calibri" panose="020F0502020204030204" pitchFamily="34" charset="0"/>
+                <a:sym typeface="Helvetica"/>
+              </a:rPr>
+              <a:t>typical</a:t>
+            </a:r>
+            <a:r>
+              <a:rPr lang="pl-PL" sz="1600" i="1" kern="0" spc="0" dirty="0">
+                <a:solidFill>
+                  <a:srgbClr val="000000"/>
+                </a:solidFill>
+                <a:latin typeface="Calibri" panose="020F0502020204030204" pitchFamily="34" charset="0"/>
+                <a:cs typeface="Calibri" panose="020F0502020204030204" pitchFamily="34" charset="0"/>
+                <a:sym typeface="Helvetica"/>
+              </a:rPr>
+              <a:t> </a:t>
+            </a:r>
+            <a:r>
+              <a:rPr lang="pl-PL" sz="1600" i="1" kern="0" spc="0" dirty="0" err="1">
+                <a:solidFill>
+                  <a:srgbClr val="000000"/>
+                </a:solidFill>
+                <a:latin typeface="Calibri" panose="020F0502020204030204" pitchFamily="34" charset="0"/>
+                <a:cs typeface="Calibri" panose="020F0502020204030204" pitchFamily="34" charset="0"/>
+                <a:sym typeface="Helvetica"/>
+              </a:rPr>
+              <a:t>use</a:t>
+            </a:r>
+            <a:r>
+              <a:rPr lang="pl-PL" sz="1600" i="1" kern="0" spc="0" dirty="0">
+                <a:solidFill>
+                  <a:srgbClr val="000000"/>
+                </a:solidFill>
+                <a:latin typeface="Calibri" panose="020F0502020204030204" pitchFamily="34" charset="0"/>
+                <a:cs typeface="Calibri" panose="020F0502020204030204" pitchFamily="34" charset="0"/>
+                <a:sym typeface="Helvetica"/>
+              </a:rPr>
+              <a:t> </a:t>
+            </a:r>
+            <a:r>
+              <a:rPr lang="pl-PL" sz="1600" i="1" kern="0" spc="0" dirty="0" err="1">
+                <a:solidFill>
+                  <a:srgbClr val="000000"/>
+                </a:solidFill>
+                <a:latin typeface="Calibri" panose="020F0502020204030204" pitchFamily="34" charset="0"/>
+                <a:cs typeface="Calibri" panose="020F0502020204030204" pitchFamily="34" charset="0"/>
+                <a:sym typeface="Helvetica"/>
+              </a:rPr>
+              <a:t>case</a:t>
+            </a:r>
+            <a:r>
+              <a:rPr lang="pl-PL" sz="1600" i="1" kern="0" spc="0" dirty="0">
+                <a:solidFill>
+                  <a:srgbClr val="000000"/>
+                </a:solidFill>
+                <a:latin typeface="Calibri" panose="020F0502020204030204" pitchFamily="34" charset="0"/>
+                <a:cs typeface="Calibri" panose="020F0502020204030204" pitchFamily="34" charset="0"/>
+                <a:sym typeface="Helvetica"/>
+              </a:rPr>
+              <a:t>)</a:t>
+            </a:r>
+            <a:endParaRPr lang="pl-PL" sz="1600" i="1" kern="0" spc="0" dirty="0">
               <a:solidFill>
                 <a:srgbClr val="000000"/>
               </a:solidFill>
-              <a:latin typeface="Calibri" panose="020F0502020204030204" pitchFamily="34" charset="0"/>
-              <a:cs typeface="Calibri" panose="020F0502020204030204" pitchFamily="34" charset="0"/>
+              <a:latin typeface="Courier New" panose="02070309020205020404" pitchFamily="49" charset="0"/>
+              <a:cs typeface="Courier New" panose="02070309020205020404" pitchFamily="49" charset="0"/>
               <a:sym typeface="Helvetica"/>
             </a:endParaRPr>
           </a:p>
@@ -11387,7 +12939,7 @@
                 <a:cs typeface="Courier New" panose="02070309020205020404" pitchFamily="49" charset="0"/>
                 <a:sym typeface="Helvetica"/>
               </a:rPr>
-              <a:t>Generator.py </a:t>
+              <a:t>Generator.py</a:t>
             </a:r>
             <a:r>
               <a:rPr lang="pl-PL" sz="1800" kern="0" spc="0" dirty="0">
@@ -11398,7 +12950,7 @@
                 <a:cs typeface="Courier New" panose="02070309020205020404" pitchFamily="49" charset="0"/>
                 <a:sym typeface="Helvetica"/>
               </a:rPr>
-              <a:t>--</a:t>
+              <a:t> –i /</a:t>
             </a:r>
             <a:r>
               <a:rPr lang="pl-PL" sz="1800" kern="0" spc="0" dirty="0" err="1">
@@ -11409,7 +12961,7 @@
                 <a:cs typeface="Courier New" panose="02070309020205020404" pitchFamily="49" charset="0"/>
                 <a:sym typeface="Helvetica"/>
               </a:rPr>
-              <a:t>docs</a:t>
+              <a:t>WPEFramework</a:t>
             </a:r>
             <a:r>
               <a:rPr lang="pl-PL" sz="1800" kern="0" spc="0" dirty="0">
@@ -11420,7 +12972,140 @@
                 <a:cs typeface="Courier New" panose="02070309020205020404" pitchFamily="49" charset="0"/>
                 <a:sym typeface="Helvetica"/>
               </a:rPr>
+              <a:t>/Source/</a:t>
+            </a:r>
+            <a:r>
+              <a:rPr lang="pl-PL" sz="1800" kern="0" spc="0" dirty="0" err="1">
+                <a:solidFill>
+                  <a:srgbClr val="000000"/>
+                </a:solidFill>
+                <a:latin typeface="Courier New" panose="02070309020205020404" pitchFamily="49" charset="0"/>
+                <a:cs typeface="Courier New" panose="02070309020205020404" pitchFamily="49" charset="0"/>
+                <a:sym typeface="Helvetica"/>
+              </a:rPr>
+              <a:t>interfaces</a:t>
+            </a:r>
+            <a:r>
+              <a:rPr lang="pl-PL" sz="1800" kern="0" spc="0" dirty="0">
+                <a:solidFill>
+                  <a:srgbClr val="000000"/>
+                </a:solidFill>
+                <a:latin typeface="Courier New" panose="02070309020205020404" pitchFamily="49" charset="0"/>
+                <a:cs typeface="Courier New" panose="02070309020205020404" pitchFamily="49" charset="0"/>
+                <a:sym typeface="Helvetica"/>
+              </a:rPr>
+              <a:t>/</a:t>
+            </a:r>
+            <a:r>
+              <a:rPr lang="pl-PL" sz="1800" kern="0" spc="0" dirty="0" err="1">
+                <a:solidFill>
+                  <a:srgbClr val="000000"/>
+                </a:solidFill>
+                <a:latin typeface="Courier New" panose="02070309020205020404" pitchFamily="49" charset="0"/>
+                <a:cs typeface="Courier New" panose="02070309020205020404" pitchFamily="49" charset="0"/>
+                <a:sym typeface="Helvetica"/>
+              </a:rPr>
+              <a:t>json</a:t>
+            </a:r>
+            <a:r>
+              <a:rPr lang="pl-PL" sz="1800" kern="0" spc="0" dirty="0">
+                <a:solidFill>
+                  <a:srgbClr val="000000"/>
+                </a:solidFill>
+                <a:latin typeface="Courier New" panose="02070309020205020404" pitchFamily="49" charset="0"/>
+                <a:cs typeface="Courier New" panose="02070309020205020404" pitchFamily="49" charset="0"/>
+                <a:sym typeface="Helvetica"/>
+              </a:rPr>
               <a:t> </a:t>
+            </a:r>
+          </a:p>
+          <a:p>
+            <a:pPr marL="0" indent="0" defTabSz="412750" latinLnBrk="1" hangingPunct="0">
+              <a:lnSpc>
+                <a:spcPct val="100000"/>
+              </a:lnSpc>
+              <a:spcBef>
+                <a:spcPts val="0"/>
+              </a:spcBef>
+              <a:buSzTx/>
+              <a:buNone/>
+            </a:pPr>
+            <a:r>
+              <a:rPr lang="pl-PL" sz="1800" kern="0" spc="0" dirty="0">
+                <a:solidFill>
+                  <a:srgbClr val="000000"/>
+                </a:solidFill>
+                <a:latin typeface="Courier New" panose="02070309020205020404" pitchFamily="49" charset="0"/>
+                <a:cs typeface="Courier New" panose="02070309020205020404" pitchFamily="49" charset="0"/>
+                <a:sym typeface="Helvetica"/>
+              </a:rPr>
+              <a:t>	  --</a:t>
+            </a:r>
+            <a:r>
+              <a:rPr lang="pl-PL" sz="1800" kern="0" spc="0" dirty="0" err="1">
+                <a:solidFill>
+                  <a:srgbClr val="000000"/>
+                </a:solidFill>
+                <a:latin typeface="Courier New" panose="02070309020205020404" pitchFamily="49" charset="0"/>
+                <a:cs typeface="Courier New" panose="02070309020205020404" pitchFamily="49" charset="0"/>
+                <a:sym typeface="Helvetica"/>
+              </a:rPr>
+              <a:t>docs</a:t>
+            </a:r>
+            <a:r>
+              <a:rPr lang="pl-PL" sz="1800" kern="0" spc="0" dirty="0">
+                <a:solidFill>
+                  <a:srgbClr val="000000"/>
+                </a:solidFill>
+                <a:latin typeface="Courier New" panose="02070309020205020404" pitchFamily="49" charset="0"/>
+                <a:cs typeface="Courier New" panose="02070309020205020404" pitchFamily="49" charset="0"/>
+                <a:sym typeface="Helvetica"/>
+              </a:rPr>
+              <a:t> /</a:t>
+            </a:r>
+            <a:r>
+              <a:rPr lang="pl-PL" sz="1800" kern="0" spc="0" dirty="0" err="1">
+                <a:solidFill>
+                  <a:srgbClr val="000000"/>
+                </a:solidFill>
+                <a:latin typeface="Courier New" panose="02070309020205020404" pitchFamily="49" charset="0"/>
+                <a:cs typeface="Courier New" panose="02070309020205020404" pitchFamily="49" charset="0"/>
+                <a:sym typeface="Helvetica"/>
+              </a:rPr>
+              <a:t>WPEFrameworkPlugins</a:t>
+            </a:r>
+            <a:r>
+              <a:rPr lang="pl-PL" sz="1800" kern="0" spc="0" dirty="0">
+                <a:solidFill>
+                  <a:srgbClr val="000000"/>
+                </a:solidFill>
+                <a:latin typeface="Courier New" panose="02070309020205020404" pitchFamily="49" charset="0"/>
+                <a:cs typeface="Courier New" panose="02070309020205020404" pitchFamily="49" charset="0"/>
+                <a:sym typeface="Helvetica"/>
+              </a:rPr>
+              <a:t>/</a:t>
+            </a:r>
+            <a:r>
+              <a:rPr lang="pl-PL" sz="1800" kern="0" spc="0" dirty="0" err="1">
+                <a:solidFill>
+                  <a:srgbClr val="000000"/>
+                </a:solidFill>
+                <a:latin typeface="Courier New" panose="02070309020205020404" pitchFamily="49" charset="0"/>
+                <a:cs typeface="Courier New" panose="02070309020205020404" pitchFamily="49" charset="0"/>
+                <a:sym typeface="Helvetica"/>
+              </a:rPr>
+              <a:t>WebKitBrowser</a:t>
+            </a:r>
+            <a:r>
+              <a:rPr lang="pl-PL" sz="1800" kern="0" spc="0" dirty="0">
+                <a:solidFill>
+                  <a:srgbClr val="000000"/>
+                </a:solidFill>
+                <a:latin typeface="Courier New" panose="02070309020205020404" pitchFamily="49" charset="0"/>
+                <a:cs typeface="Courier New" panose="02070309020205020404" pitchFamily="49" charset="0"/>
+                <a:sym typeface="Helvetica"/>
+              </a:rPr>
+              <a:t>/</a:t>
             </a:r>
             <a:r>
               <a:rPr lang="pl-PL" sz="1800" kern="0" spc="0" dirty="0" err="1">
@@ -13512,10 +15197,21 @@
                 <a:cs typeface="Calibri" panose="020F0502020204030204" pitchFamily="34" charset="0"/>
                 <a:sym typeface="Helvetica"/>
               </a:rPr>
-              <a:t> JSON </a:t>
-            </a:r>
-            <a:r>
-              <a:rPr lang="pl-PL" sz="2000" kern="0" spc="0" dirty="0" err="1">
+              <a:t> </a:t>
+            </a:r>
+            <a:r>
+              <a:rPr lang="pl-PL" sz="2000" i="1" kern="0" spc="0" dirty="0">
+                <a:solidFill>
+                  <a:srgbClr val="000000"/>
+                </a:solidFill>
+                <a:latin typeface="Calibri" panose="020F0502020204030204" pitchFamily="34" charset="0"/>
+                <a:cs typeface="Calibri" panose="020F0502020204030204" pitchFamily="34" charset="0"/>
+                <a:sym typeface="Helvetica"/>
+              </a:rPr>
+              <a:t>JSON </a:t>
+            </a:r>
+            <a:r>
+              <a:rPr lang="pl-PL" sz="2000" i="1" kern="0" spc="0" dirty="0" err="1">
                 <a:solidFill>
                   <a:srgbClr val="000000"/>
                 </a:solidFill>
@@ -14343,6 +16039,212 @@
                 <a:sym typeface="Helvetica"/>
               </a:rPr>
               <a:t>optional</a:t>
+            </a:r>
+            <a:endParaRPr lang="pl-PL" sz="2000" kern="0" spc="0" dirty="0">
+              <a:solidFill>
+                <a:srgbClr val="000000"/>
+              </a:solidFill>
+              <a:latin typeface="Calibri" panose="020F0502020204030204" pitchFamily="34" charset="0"/>
+              <a:cs typeface="Calibri" panose="020F0502020204030204" pitchFamily="34" charset="0"/>
+              <a:sym typeface="Helvetica"/>
+            </a:endParaRPr>
+          </a:p>
+          <a:p>
+            <a:pPr defTabSz="412750" latinLnBrk="1" hangingPunct="0">
+              <a:lnSpc>
+                <a:spcPct val="100000"/>
+              </a:lnSpc>
+              <a:spcBef>
+                <a:spcPts val="0"/>
+              </a:spcBef>
+              <a:buSzTx/>
+            </a:pPr>
+            <a:r>
+              <a:rPr lang="pl-PL" sz="2000" i="1" kern="0" spc="0" dirty="0" err="1">
+                <a:solidFill>
+                  <a:srgbClr val="000000"/>
+                </a:solidFill>
+                <a:latin typeface="Calibri" panose="020F0502020204030204" pitchFamily="34" charset="0"/>
+                <a:cs typeface="Calibri" panose="020F0502020204030204" pitchFamily="34" charset="0"/>
+                <a:sym typeface="Helvetica"/>
+              </a:rPr>
+              <a:t>enum</a:t>
+            </a:r>
+            <a:r>
+              <a:rPr lang="pl-PL" sz="2000" kern="0" spc="0" dirty="0">
+                <a:solidFill>
+                  <a:srgbClr val="000000"/>
+                </a:solidFill>
+                <a:latin typeface="Calibri" panose="020F0502020204030204" pitchFamily="34" charset="0"/>
+                <a:cs typeface="Calibri" panose="020F0502020204030204" pitchFamily="34" charset="0"/>
+                <a:sym typeface="Helvetica"/>
+              </a:rPr>
+              <a:t> – </a:t>
+            </a:r>
+            <a:r>
+              <a:rPr lang="pl-PL" sz="2000" kern="0" spc="0" dirty="0" err="1">
+                <a:solidFill>
+                  <a:srgbClr val="000000"/>
+                </a:solidFill>
+                <a:latin typeface="Calibri" panose="020F0502020204030204" pitchFamily="34" charset="0"/>
+                <a:cs typeface="Calibri" panose="020F0502020204030204" pitchFamily="34" charset="0"/>
+                <a:sym typeface="Helvetica"/>
+              </a:rPr>
+              <a:t>an</a:t>
+            </a:r>
+            <a:r>
+              <a:rPr lang="pl-PL" sz="2000" kern="0" spc="0" dirty="0">
+                <a:solidFill>
+                  <a:srgbClr val="000000"/>
+                </a:solidFill>
+                <a:latin typeface="Calibri" panose="020F0502020204030204" pitchFamily="34" charset="0"/>
+                <a:cs typeface="Calibri" panose="020F0502020204030204" pitchFamily="34" charset="0"/>
+                <a:sym typeface="Helvetica"/>
+              </a:rPr>
+              <a:t> </a:t>
+            </a:r>
+            <a:r>
+              <a:rPr lang="pl-PL" sz="2000" kern="0" spc="0" dirty="0" err="1">
+                <a:solidFill>
+                  <a:srgbClr val="000000"/>
+                </a:solidFill>
+                <a:latin typeface="Calibri" panose="020F0502020204030204" pitchFamily="34" charset="0"/>
+                <a:cs typeface="Calibri" panose="020F0502020204030204" pitchFamily="34" charset="0"/>
+                <a:sym typeface="Helvetica"/>
+              </a:rPr>
+              <a:t>array</a:t>
+            </a:r>
+            <a:r>
+              <a:rPr lang="pl-PL" sz="2000" kern="0" spc="0" dirty="0">
+                <a:solidFill>
+                  <a:srgbClr val="000000"/>
+                </a:solidFill>
+                <a:latin typeface="Calibri" panose="020F0502020204030204" pitchFamily="34" charset="0"/>
+                <a:cs typeface="Calibri" panose="020F0502020204030204" pitchFamily="34" charset="0"/>
+                <a:sym typeface="Helvetica"/>
+              </a:rPr>
+              <a:t>, </a:t>
+            </a:r>
+            <a:r>
+              <a:rPr lang="pl-PL" sz="2000" kern="0" spc="0" dirty="0" err="1">
+                <a:solidFill>
+                  <a:srgbClr val="000000"/>
+                </a:solidFill>
+                <a:latin typeface="Calibri" panose="020F0502020204030204" pitchFamily="34" charset="0"/>
+                <a:cs typeface="Calibri" panose="020F0502020204030204" pitchFamily="34" charset="0"/>
+                <a:sym typeface="Helvetica"/>
+              </a:rPr>
+              <a:t>denotes</a:t>
+            </a:r>
+            <a:r>
+              <a:rPr lang="pl-PL" sz="2000" kern="0" spc="0" dirty="0">
+                <a:solidFill>
+                  <a:srgbClr val="000000"/>
+                </a:solidFill>
+                <a:latin typeface="Calibri" panose="020F0502020204030204" pitchFamily="34" charset="0"/>
+                <a:cs typeface="Calibri" panose="020F0502020204030204" pitchFamily="34" charset="0"/>
+                <a:sym typeface="Helvetica"/>
+              </a:rPr>
+              <a:t> the </a:t>
+            </a:r>
+            <a:r>
+              <a:rPr lang="pl-PL" sz="2000" kern="0" spc="0" dirty="0" err="1">
+                <a:solidFill>
+                  <a:srgbClr val="000000"/>
+                </a:solidFill>
+                <a:latin typeface="Calibri" panose="020F0502020204030204" pitchFamily="34" charset="0"/>
+                <a:cs typeface="Calibri" panose="020F0502020204030204" pitchFamily="34" charset="0"/>
+                <a:sym typeface="Helvetica"/>
+              </a:rPr>
+              <a:t>property</a:t>
+            </a:r>
+            <a:r>
+              <a:rPr lang="pl-PL" sz="2000" kern="0" spc="0" dirty="0">
+                <a:solidFill>
+                  <a:srgbClr val="000000"/>
+                </a:solidFill>
+                <a:latin typeface="Calibri" panose="020F0502020204030204" pitchFamily="34" charset="0"/>
+                <a:cs typeface="Calibri" panose="020F0502020204030204" pitchFamily="34" charset="0"/>
+                <a:sym typeface="Helvetica"/>
+              </a:rPr>
+              <a:t> as </a:t>
+            </a:r>
+            <a:r>
+              <a:rPr lang="pl-PL" sz="2000" kern="0" spc="0" dirty="0" err="1">
+                <a:solidFill>
+                  <a:srgbClr val="000000"/>
+                </a:solidFill>
+                <a:latin typeface="Calibri" panose="020F0502020204030204" pitchFamily="34" charset="0"/>
+                <a:cs typeface="Calibri" panose="020F0502020204030204" pitchFamily="34" charset="0"/>
+                <a:sym typeface="Helvetica"/>
+              </a:rPr>
+              <a:t>an</a:t>
+            </a:r>
+            <a:r>
+              <a:rPr lang="pl-PL" sz="2000" kern="0" spc="0" dirty="0">
+                <a:solidFill>
+                  <a:srgbClr val="000000"/>
+                </a:solidFill>
+                <a:latin typeface="Calibri" panose="020F0502020204030204" pitchFamily="34" charset="0"/>
+                <a:cs typeface="Calibri" panose="020F0502020204030204" pitchFamily="34" charset="0"/>
+                <a:sym typeface="Helvetica"/>
+              </a:rPr>
+              <a:t> </a:t>
+            </a:r>
+            <a:r>
+              <a:rPr lang="pl-PL" sz="2000" kern="0" spc="0" dirty="0" err="1">
+                <a:solidFill>
+                  <a:srgbClr val="000000"/>
+                </a:solidFill>
+                <a:latin typeface="Calibri" panose="020F0502020204030204" pitchFamily="34" charset="0"/>
+                <a:cs typeface="Calibri" panose="020F0502020204030204" pitchFamily="34" charset="0"/>
+                <a:sym typeface="Helvetica"/>
+              </a:rPr>
+              <a:t>enum</a:t>
+            </a:r>
+            <a:r>
+              <a:rPr lang="pl-PL" sz="2000" kern="0" spc="0" dirty="0">
+                <a:solidFill>
+                  <a:srgbClr val="000000"/>
+                </a:solidFill>
+                <a:latin typeface="Calibri" panose="020F0502020204030204" pitchFamily="34" charset="0"/>
+                <a:cs typeface="Calibri" panose="020F0502020204030204" pitchFamily="34" charset="0"/>
+                <a:sym typeface="Helvetica"/>
+              </a:rPr>
+              <a:t> and </a:t>
+            </a:r>
+            <a:r>
+              <a:rPr lang="pl-PL" sz="2000" kern="0" spc="0" dirty="0" err="1">
+                <a:solidFill>
+                  <a:srgbClr val="000000"/>
+                </a:solidFill>
+                <a:latin typeface="Calibri" panose="020F0502020204030204" pitchFamily="34" charset="0"/>
+                <a:cs typeface="Calibri" panose="020F0502020204030204" pitchFamily="34" charset="0"/>
+                <a:sym typeface="Helvetica"/>
+              </a:rPr>
+              <a:t>lists</a:t>
+            </a:r>
+            <a:r>
+              <a:rPr lang="pl-PL" sz="2000" kern="0" spc="0" dirty="0">
+                <a:solidFill>
+                  <a:srgbClr val="000000"/>
+                </a:solidFill>
+                <a:latin typeface="Calibri" panose="020F0502020204030204" pitchFamily="34" charset="0"/>
+                <a:cs typeface="Calibri" panose="020F0502020204030204" pitchFamily="34" charset="0"/>
+                <a:sym typeface="Helvetica"/>
+              </a:rPr>
+              <a:t> the </a:t>
+            </a:r>
+            <a:r>
+              <a:rPr lang="pl-PL" sz="2000" kern="0" spc="0" dirty="0" err="1">
+                <a:solidFill>
+                  <a:srgbClr val="000000"/>
+                </a:solidFill>
+                <a:latin typeface="Calibri" panose="020F0502020204030204" pitchFamily="34" charset="0"/>
+                <a:cs typeface="Calibri" panose="020F0502020204030204" pitchFamily="34" charset="0"/>
+                <a:sym typeface="Helvetica"/>
+              </a:rPr>
+              <a:t>enumerators</a:t>
             </a:r>
             <a:endParaRPr lang="pl-PL" sz="2000" kern="0" spc="0" dirty="0">
               <a:solidFill>
@@ -14543,6 +16445,39 @@
                 <a:cs typeface="Calibri" panose="020F0502020204030204" pitchFamily="34" charset="0"/>
                 <a:sym typeface="Helvetica"/>
               </a:rPr>
+              <a:t>, non-</a:t>
+            </a:r>
+            <a:r>
+              <a:rPr lang="pl-PL" sz="2000" i="1" kern="0" spc="0" dirty="0">
+                <a:solidFill>
+                  <a:srgbClr val="000000"/>
+                </a:solidFill>
+                <a:latin typeface="Calibri" panose="020F0502020204030204" pitchFamily="34" charset="0"/>
+                <a:cs typeface="Calibri" panose="020F0502020204030204" pitchFamily="34" charset="0"/>
+                <a:sym typeface="Helvetica"/>
+              </a:rPr>
+              <a:t>JSON </a:t>
+            </a:r>
+            <a:r>
+              <a:rPr lang="pl-PL" sz="2000" i="1" kern="0" spc="0" dirty="0" err="1">
+                <a:solidFill>
+                  <a:srgbClr val="000000"/>
+                </a:solidFill>
+                <a:latin typeface="Calibri" panose="020F0502020204030204" pitchFamily="34" charset="0"/>
+                <a:cs typeface="Calibri" panose="020F0502020204030204" pitchFamily="34" charset="0"/>
+                <a:sym typeface="Helvetica"/>
+              </a:rPr>
+              <a:t>Schema</a:t>
+            </a:r>
+            <a:r>
+              <a:rPr lang="pl-PL" sz="2000" kern="0" spc="0" dirty="0">
+                <a:solidFill>
+                  <a:srgbClr val="000000"/>
+                </a:solidFill>
+                <a:latin typeface="Calibri" panose="020F0502020204030204" pitchFamily="34" charset="0"/>
+                <a:cs typeface="Calibri" panose="020F0502020204030204" pitchFamily="34" charset="0"/>
+                <a:sym typeface="Helvetica"/>
+              </a:rPr>
               <a:t> </a:t>
             </a:r>
             <a:r>
@@ -14786,212 +16721,6 @@
                 <a:sym typeface="Helvetica"/>
               </a:rPr>
               <a:t>code</a:t>
-            </a:r>
-            <a:endParaRPr lang="pl-PL" sz="2000" kern="0" spc="0" dirty="0">
-              <a:solidFill>
-                <a:srgbClr val="000000"/>
-              </a:solidFill>
-              <a:latin typeface="Calibri" panose="020F0502020204030204" pitchFamily="34" charset="0"/>
-              <a:cs typeface="Calibri" panose="020F0502020204030204" pitchFamily="34" charset="0"/>
-              <a:sym typeface="Helvetica"/>
-            </a:endParaRPr>
-          </a:p>
-          <a:p>
-            <a:pPr defTabSz="412750" latinLnBrk="1" hangingPunct="0">
-              <a:lnSpc>
-                <a:spcPct val="100000"/>
-              </a:lnSpc>
-              <a:spcBef>
-                <a:spcPts val="0"/>
-              </a:spcBef>
-              <a:buSzTx/>
-            </a:pPr>
-            <a:r>
-              <a:rPr lang="pl-PL" sz="2000" i="1" kern="0" spc="0" dirty="0" err="1">
-                <a:solidFill>
-                  <a:srgbClr val="000000"/>
-                </a:solidFill>
-                <a:latin typeface="Calibri" panose="020F0502020204030204" pitchFamily="34" charset="0"/>
-                <a:cs typeface="Calibri" panose="020F0502020204030204" pitchFamily="34" charset="0"/>
-                <a:sym typeface="Helvetica"/>
-              </a:rPr>
-              <a:t>enum</a:t>
-            </a:r>
-            <a:r>
-              <a:rPr lang="pl-PL" sz="2000" kern="0" spc="0" dirty="0">
-                <a:solidFill>
-                  <a:srgbClr val="000000"/>
-                </a:solidFill>
-                <a:latin typeface="Calibri" panose="020F0502020204030204" pitchFamily="34" charset="0"/>
-                <a:cs typeface="Calibri" panose="020F0502020204030204" pitchFamily="34" charset="0"/>
-                <a:sym typeface="Helvetica"/>
-              </a:rPr>
-              <a:t> – </a:t>
-            </a:r>
-            <a:r>
-              <a:rPr lang="pl-PL" sz="2000" kern="0" spc="0" dirty="0" err="1">
-                <a:solidFill>
-                  <a:srgbClr val="000000"/>
-                </a:solidFill>
-                <a:latin typeface="Calibri" panose="020F0502020204030204" pitchFamily="34" charset="0"/>
-                <a:cs typeface="Calibri" panose="020F0502020204030204" pitchFamily="34" charset="0"/>
-                <a:sym typeface="Helvetica"/>
-              </a:rPr>
-              <a:t>an</a:t>
-            </a:r>
-            <a:r>
-              <a:rPr lang="pl-PL" sz="2000" kern="0" spc="0" dirty="0">
-                <a:solidFill>
-                  <a:srgbClr val="000000"/>
-                </a:solidFill>
-                <a:latin typeface="Calibri" panose="020F0502020204030204" pitchFamily="34" charset="0"/>
-                <a:cs typeface="Calibri" panose="020F0502020204030204" pitchFamily="34" charset="0"/>
-                <a:sym typeface="Helvetica"/>
-              </a:rPr>
-              <a:t> </a:t>
-            </a:r>
-            <a:r>
-              <a:rPr lang="pl-PL" sz="2000" kern="0" spc="0" dirty="0" err="1">
-                <a:solidFill>
-                  <a:srgbClr val="000000"/>
-                </a:solidFill>
-                <a:latin typeface="Calibri" panose="020F0502020204030204" pitchFamily="34" charset="0"/>
-                <a:cs typeface="Calibri" panose="020F0502020204030204" pitchFamily="34" charset="0"/>
-                <a:sym typeface="Helvetica"/>
-              </a:rPr>
-              <a:t>array</a:t>
-            </a:r>
-            <a:r>
-              <a:rPr lang="pl-PL" sz="2000" kern="0" spc="0" dirty="0">
-                <a:solidFill>
-                  <a:srgbClr val="000000"/>
-                </a:solidFill>
-                <a:latin typeface="Calibri" panose="020F0502020204030204" pitchFamily="34" charset="0"/>
-                <a:cs typeface="Calibri" panose="020F0502020204030204" pitchFamily="34" charset="0"/>
-                <a:sym typeface="Helvetica"/>
-              </a:rPr>
-              <a:t>, </a:t>
-            </a:r>
-            <a:r>
-              <a:rPr lang="pl-PL" sz="2000" kern="0" spc="0" dirty="0" err="1">
-                <a:solidFill>
-                  <a:srgbClr val="000000"/>
-                </a:solidFill>
-                <a:latin typeface="Calibri" panose="020F0502020204030204" pitchFamily="34" charset="0"/>
-                <a:cs typeface="Calibri" panose="020F0502020204030204" pitchFamily="34" charset="0"/>
-                <a:sym typeface="Helvetica"/>
-              </a:rPr>
-              <a:t>denotes</a:t>
-            </a:r>
-            <a:r>
-              <a:rPr lang="pl-PL" sz="2000" kern="0" spc="0" dirty="0">
-                <a:solidFill>
-                  <a:srgbClr val="000000"/>
-                </a:solidFill>
-                <a:latin typeface="Calibri" panose="020F0502020204030204" pitchFamily="34" charset="0"/>
-                <a:cs typeface="Calibri" panose="020F0502020204030204" pitchFamily="34" charset="0"/>
-                <a:sym typeface="Helvetica"/>
-              </a:rPr>
-              <a:t> the </a:t>
-            </a:r>
-            <a:r>
-              <a:rPr lang="pl-PL" sz="2000" kern="0" spc="0" dirty="0" err="1">
-                <a:solidFill>
-                  <a:srgbClr val="000000"/>
-                </a:solidFill>
-                <a:latin typeface="Calibri" panose="020F0502020204030204" pitchFamily="34" charset="0"/>
-                <a:cs typeface="Calibri" panose="020F0502020204030204" pitchFamily="34" charset="0"/>
-                <a:sym typeface="Helvetica"/>
-              </a:rPr>
-              <a:t>property</a:t>
-            </a:r>
-            <a:r>
-              <a:rPr lang="pl-PL" sz="2000" kern="0" spc="0" dirty="0">
-                <a:solidFill>
-                  <a:srgbClr val="000000"/>
-                </a:solidFill>
-                <a:latin typeface="Calibri" panose="020F0502020204030204" pitchFamily="34" charset="0"/>
-                <a:cs typeface="Calibri" panose="020F0502020204030204" pitchFamily="34" charset="0"/>
-                <a:sym typeface="Helvetica"/>
-              </a:rPr>
-              <a:t> as </a:t>
-            </a:r>
-            <a:r>
-              <a:rPr lang="pl-PL" sz="2000" kern="0" spc="0" dirty="0" err="1">
-                <a:solidFill>
-                  <a:srgbClr val="000000"/>
-                </a:solidFill>
-                <a:latin typeface="Calibri" panose="020F0502020204030204" pitchFamily="34" charset="0"/>
-                <a:cs typeface="Calibri" panose="020F0502020204030204" pitchFamily="34" charset="0"/>
-                <a:sym typeface="Helvetica"/>
-              </a:rPr>
-              <a:t>an</a:t>
-            </a:r>
-            <a:r>
-              <a:rPr lang="pl-PL" sz="2000" kern="0" spc="0" dirty="0">
-                <a:solidFill>
-                  <a:srgbClr val="000000"/>
-                </a:solidFill>
-                <a:latin typeface="Calibri" panose="020F0502020204030204" pitchFamily="34" charset="0"/>
-                <a:cs typeface="Calibri" panose="020F0502020204030204" pitchFamily="34" charset="0"/>
-                <a:sym typeface="Helvetica"/>
-              </a:rPr>
-              <a:t> </a:t>
-            </a:r>
-            <a:r>
-              <a:rPr lang="pl-PL" sz="2000" kern="0" spc="0" dirty="0" err="1">
-                <a:solidFill>
-                  <a:srgbClr val="000000"/>
-                </a:solidFill>
-                <a:latin typeface="Calibri" panose="020F0502020204030204" pitchFamily="34" charset="0"/>
-                <a:cs typeface="Calibri" panose="020F0502020204030204" pitchFamily="34" charset="0"/>
-                <a:sym typeface="Helvetica"/>
-              </a:rPr>
-              <a:t>enum</a:t>
-            </a:r>
-            <a:r>
-              <a:rPr lang="pl-PL" sz="2000" kern="0" spc="0" dirty="0">
-                <a:solidFill>
-                  <a:srgbClr val="000000"/>
-                </a:solidFill>
-                <a:latin typeface="Calibri" panose="020F0502020204030204" pitchFamily="34" charset="0"/>
-                <a:cs typeface="Calibri" panose="020F0502020204030204" pitchFamily="34" charset="0"/>
-                <a:sym typeface="Helvetica"/>
-              </a:rPr>
-              <a:t> and </a:t>
-            </a:r>
-            <a:r>
-              <a:rPr lang="pl-PL" sz="2000" kern="0" spc="0" dirty="0" err="1">
-                <a:solidFill>
-                  <a:srgbClr val="000000"/>
-                </a:solidFill>
-                <a:latin typeface="Calibri" panose="020F0502020204030204" pitchFamily="34" charset="0"/>
-                <a:cs typeface="Calibri" panose="020F0502020204030204" pitchFamily="34" charset="0"/>
-                <a:sym typeface="Helvetica"/>
-              </a:rPr>
-              <a:t>lists</a:t>
-            </a:r>
-            <a:r>
-              <a:rPr lang="pl-PL" sz="2000" kern="0" spc="0" dirty="0">
-                <a:solidFill>
-                  <a:srgbClr val="000000"/>
-                </a:solidFill>
-                <a:latin typeface="Calibri" panose="020F0502020204030204" pitchFamily="34" charset="0"/>
-                <a:cs typeface="Calibri" panose="020F0502020204030204" pitchFamily="34" charset="0"/>
-                <a:sym typeface="Helvetica"/>
-              </a:rPr>
-              <a:t> the </a:t>
-            </a:r>
-            <a:r>
-              <a:rPr lang="pl-PL" sz="2000" kern="0" spc="0" dirty="0" err="1">
-                <a:solidFill>
-                  <a:srgbClr val="000000"/>
-                </a:solidFill>
-                <a:latin typeface="Calibri" panose="020F0502020204030204" pitchFamily="34" charset="0"/>
-                <a:cs typeface="Calibri" panose="020F0502020204030204" pitchFamily="34" charset="0"/>
-                <a:sym typeface="Helvetica"/>
-              </a:rPr>
-              <a:t>enumerators</a:t>
             </a:r>
             <a:endParaRPr lang="pl-PL" sz="2000" kern="0" spc="0" dirty="0">
               <a:solidFill>
@@ -16336,14 +18065,17 @@
               </a:rPr>
               <a:t>handling</a:t>
             </a:r>
-            <a:endParaRPr lang="pl-PL" sz="2400" kern="0" spc="0" dirty="0">
-              <a:solidFill>
-                <a:srgbClr val="000000"/>
-              </a:solidFill>
-              <a:latin typeface="Calibri" panose="020F0502020204030204" pitchFamily="34" charset="0"/>
-              <a:cs typeface="Calibri" panose="020F0502020204030204" pitchFamily="34" charset="0"/>
-              <a:sym typeface="Helvetica"/>
-            </a:endParaRPr>
+            <a:r>
+              <a:rPr lang="pl-PL" sz="2400" kern="0" spc="0" dirty="0">
+                <a:solidFill>
+                  <a:srgbClr val="000000"/>
+                </a:solidFill>
+                <a:latin typeface="Calibri" panose="020F0502020204030204" pitchFamily="34" charset="0"/>
+                <a:cs typeface="Calibri" panose="020F0502020204030204" pitchFamily="34" charset="0"/>
+                <a:sym typeface="Helvetica"/>
+              </a:rPr>
+              <a:t>:</a:t>
+            </a:r>
           </a:p>
           <a:p>
             <a:pPr defTabSz="412750" latinLnBrk="1" hangingPunct="0">

</xml_diff>